<commit_message>
Cleaned up some of the PowerPoint
</commit_message>
<xml_diff>
--- a/Azure Cloud Services.pptx
+++ b/Azure Cloud Services.pptx
@@ -1990,6 +1990,13 @@
         </dgm:presLayoutVars>
       </dgm:prSet>
       <dgm:spPr/>
+      <dgm:t>
+        <a:bodyPr/>
+        <a:lstStyle/>
+        <a:p>
+          <a:endParaRPr lang="en-US"/>
+        </a:p>
+      </dgm:t>
     </dgm:pt>
     <dgm:pt modelId="{9C383881-4922-469A-875E-FF0AB0471C3C}" type="pres">
       <dgm:prSet presAssocID="{6C26E894-0E63-459F-9B14-2012EE98C7C8}" presName="hierFlow" presStyleCnt="0"/>
@@ -2035,138 +2042,6 @@
     <dgm:pt modelId="{D288014C-3523-4477-B75E-1FCECF49E873}" type="pres">
       <dgm:prSet presAssocID="{5C607756-2849-4916-9E0E-1BDA1A36DFF5}" presName="Name25" presStyleLbl="parChTrans1D2" presStyleIdx="0" presStyleCnt="2"/>
       <dgm:spPr/>
-    </dgm:pt>
-    <dgm:pt modelId="{E6353FE9-924F-409B-8F8B-B03CAD099642}" type="pres">
-      <dgm:prSet presAssocID="{5C607756-2849-4916-9E0E-1BDA1A36DFF5}" presName="connTx" presStyleLbl="parChTrans1D2" presStyleIdx="0" presStyleCnt="2"/>
-      <dgm:spPr/>
-    </dgm:pt>
-    <dgm:pt modelId="{A7CAFE8F-A56B-414A-87DC-6CC8BDA719B9}" type="pres">
-      <dgm:prSet presAssocID="{BEF36ED1-BEBA-49C7-A6E0-254AD00AEA28}" presName="Name30" presStyleCnt="0"/>
-      <dgm:spPr/>
-    </dgm:pt>
-    <dgm:pt modelId="{1DC923BE-4EF5-42DA-8517-61665C2754EB}" type="pres">
-      <dgm:prSet presAssocID="{BEF36ED1-BEBA-49C7-A6E0-254AD00AEA28}" presName="level2Shape" presStyleLbl="node2" presStyleIdx="0" presStyleCnt="2"/>
-      <dgm:spPr/>
-    </dgm:pt>
-    <dgm:pt modelId="{DD69F295-4AAF-45BA-8FF5-A0064DFE5F6B}" type="pres">
-      <dgm:prSet presAssocID="{BEF36ED1-BEBA-49C7-A6E0-254AD00AEA28}" presName="hierChild3" presStyleCnt="0"/>
-      <dgm:spPr/>
-    </dgm:pt>
-    <dgm:pt modelId="{DD8A9B2E-E296-47C0-8000-922200AD4C78}" type="pres">
-      <dgm:prSet presAssocID="{C6D946E8-DF00-4E78-A3DA-BD964E870187}" presName="Name25" presStyleLbl="parChTrans1D3" presStyleIdx="0" presStyleCnt="3"/>
-      <dgm:spPr/>
-    </dgm:pt>
-    <dgm:pt modelId="{35BE477E-CFD8-4D31-AAD9-55B6FA729D69}" type="pres">
-      <dgm:prSet presAssocID="{C6D946E8-DF00-4E78-A3DA-BD964E870187}" presName="connTx" presStyleLbl="parChTrans1D3" presStyleIdx="0" presStyleCnt="3"/>
-      <dgm:spPr/>
-    </dgm:pt>
-    <dgm:pt modelId="{0B88785D-C52B-4421-BACF-F1A258F794BE}" type="pres">
-      <dgm:prSet presAssocID="{E6E67D21-FB74-496F-8593-A02B9705A778}" presName="Name30" presStyleCnt="0"/>
-      <dgm:spPr/>
-    </dgm:pt>
-    <dgm:pt modelId="{D380E640-43FF-4569-83A7-3E1A450D90BB}" type="pres">
-      <dgm:prSet presAssocID="{E6E67D21-FB74-496F-8593-A02B9705A778}" presName="level2Shape" presStyleLbl="node3" presStyleIdx="0" presStyleCnt="3"/>
-      <dgm:spPr/>
-    </dgm:pt>
-    <dgm:pt modelId="{CAEFEDE3-41E0-4C05-B2BF-A0D819396CA6}" type="pres">
-      <dgm:prSet presAssocID="{E6E67D21-FB74-496F-8593-A02B9705A778}" presName="hierChild3" presStyleCnt="0"/>
-      <dgm:spPr/>
-    </dgm:pt>
-    <dgm:pt modelId="{D5FA0CD8-7B13-4C06-849E-35CC554CD50E}" type="pres">
-      <dgm:prSet presAssocID="{412CFE73-26BA-4002-A64E-270752048FE0}" presName="Name25" presStyleLbl="parChTrans1D3" presStyleIdx="1" presStyleCnt="3"/>
-      <dgm:spPr/>
-    </dgm:pt>
-    <dgm:pt modelId="{C09EAD11-4F9B-4FC0-AC74-E50CD152359A}" type="pres">
-      <dgm:prSet presAssocID="{412CFE73-26BA-4002-A64E-270752048FE0}" presName="connTx" presStyleLbl="parChTrans1D3" presStyleIdx="1" presStyleCnt="3"/>
-      <dgm:spPr/>
-    </dgm:pt>
-    <dgm:pt modelId="{3978A8BE-2ADD-47C5-9640-4D7A684272C2}" type="pres">
-      <dgm:prSet presAssocID="{845FB137-63EF-4496-B95A-21C637112DAE}" presName="Name30" presStyleCnt="0"/>
-      <dgm:spPr/>
-    </dgm:pt>
-    <dgm:pt modelId="{D2A55942-24C2-443D-BE47-D1253E0F9BEF}" type="pres">
-      <dgm:prSet presAssocID="{845FB137-63EF-4496-B95A-21C637112DAE}" presName="level2Shape" presStyleLbl="node3" presStyleIdx="1" presStyleCnt="3"/>
-      <dgm:spPr/>
-    </dgm:pt>
-    <dgm:pt modelId="{041CA751-B1DE-4744-B467-7F2CB570F30C}" type="pres">
-      <dgm:prSet presAssocID="{845FB137-63EF-4496-B95A-21C637112DAE}" presName="hierChild3" presStyleCnt="0"/>
-      <dgm:spPr/>
-    </dgm:pt>
-    <dgm:pt modelId="{C918FCEE-4612-4AC8-966D-A84A3B6E5CBB}" type="pres">
-      <dgm:prSet presAssocID="{E1D7A31C-182D-4BB0-A7CB-97ACE60F6E66}" presName="Name25" presStyleLbl="parChTrans1D2" presStyleIdx="1" presStyleCnt="2"/>
-      <dgm:spPr/>
-    </dgm:pt>
-    <dgm:pt modelId="{4BB69C3D-5405-48ED-A297-7C6A2B335244}" type="pres">
-      <dgm:prSet presAssocID="{E1D7A31C-182D-4BB0-A7CB-97ACE60F6E66}" presName="connTx" presStyleLbl="parChTrans1D2" presStyleIdx="1" presStyleCnt="2"/>
-      <dgm:spPr/>
-    </dgm:pt>
-    <dgm:pt modelId="{15FB57E0-A88B-4971-BCBC-D4235FC75128}" type="pres">
-      <dgm:prSet presAssocID="{FE82EA91-EA49-4952-B666-5356CDAE6BA0}" presName="Name30" presStyleCnt="0"/>
-      <dgm:spPr/>
-    </dgm:pt>
-    <dgm:pt modelId="{575ABB36-2536-4BEE-B166-1F5CAC627ED9}" type="pres">
-      <dgm:prSet presAssocID="{FE82EA91-EA49-4952-B666-5356CDAE6BA0}" presName="level2Shape" presStyleLbl="node2" presStyleIdx="1" presStyleCnt="2"/>
-      <dgm:spPr/>
-    </dgm:pt>
-    <dgm:pt modelId="{E238D4A1-0990-4115-939D-D190903F2E82}" type="pres">
-      <dgm:prSet presAssocID="{FE82EA91-EA49-4952-B666-5356CDAE6BA0}" presName="hierChild3" presStyleCnt="0"/>
-      <dgm:spPr/>
-    </dgm:pt>
-    <dgm:pt modelId="{AEE26041-0EC8-4C2F-B740-B5D536742BB6}" type="pres">
-      <dgm:prSet presAssocID="{FEFB7150-D722-4B84-ADC9-46811C3E13E6}" presName="Name25" presStyleLbl="parChTrans1D3" presStyleIdx="2" presStyleCnt="3"/>
-      <dgm:spPr/>
-    </dgm:pt>
-    <dgm:pt modelId="{4D3A1D79-95DD-44B1-A556-5A7B8916AE94}" type="pres">
-      <dgm:prSet presAssocID="{FEFB7150-D722-4B84-ADC9-46811C3E13E6}" presName="connTx" presStyleLbl="parChTrans1D3" presStyleIdx="2" presStyleCnt="3"/>
-      <dgm:spPr/>
-    </dgm:pt>
-    <dgm:pt modelId="{22A1CC9C-E777-4D21-B3EF-148029B59D07}" type="pres">
-      <dgm:prSet presAssocID="{8FF50655-8487-4B4E-B83D-4F0AF1FA252E}" presName="Name30" presStyleCnt="0"/>
-      <dgm:spPr/>
-    </dgm:pt>
-    <dgm:pt modelId="{87630057-8D34-4E32-9EA4-2707D2D0D058}" type="pres">
-      <dgm:prSet presAssocID="{8FF50655-8487-4B4E-B83D-4F0AF1FA252E}" presName="level2Shape" presStyleLbl="node3" presStyleIdx="2" presStyleCnt="3"/>
-      <dgm:spPr/>
-    </dgm:pt>
-    <dgm:pt modelId="{C085690A-2679-4356-BD20-6CE4D79A02D4}" type="pres">
-      <dgm:prSet presAssocID="{8FF50655-8487-4B4E-B83D-4F0AF1FA252E}" presName="hierChild3" presStyleCnt="0"/>
-      <dgm:spPr/>
-    </dgm:pt>
-    <dgm:pt modelId="{7EEF3A8F-B83C-4047-AE77-EE130ABA78EB}" type="pres">
-      <dgm:prSet presAssocID="{6C26E894-0E63-459F-9B14-2012EE98C7C8}" presName="bgShapesFlow" presStyleCnt="0"/>
-      <dgm:spPr/>
-    </dgm:pt>
-    <dgm:pt modelId="{F65D6DE6-AD75-4DF0-AB27-E72FC137C2DC}" type="pres">
-      <dgm:prSet presAssocID="{D3A25813-4F2D-41E1-816A-FC4243F4D750}" presName="rectComp" presStyleCnt="0"/>
-      <dgm:spPr/>
-    </dgm:pt>
-    <dgm:pt modelId="{5BD92FB9-5AB2-423A-8E1A-8FD678F75648}" type="pres">
-      <dgm:prSet presAssocID="{D3A25813-4F2D-41E1-816A-FC4243F4D750}" presName="bgRect" presStyleLbl="bgShp" presStyleIdx="0" presStyleCnt="3"/>
-      <dgm:spPr/>
-    </dgm:pt>
-    <dgm:pt modelId="{388B4181-C1FC-4A5B-9FDD-B8B75DDAAF2F}" type="pres">
-      <dgm:prSet presAssocID="{D3A25813-4F2D-41E1-816A-FC4243F4D750}" presName="bgRectTx" presStyleLbl="bgShp" presStyleIdx="0" presStyleCnt="3">
-        <dgm:presLayoutVars>
-          <dgm:bulletEnabled val="1"/>
-        </dgm:presLayoutVars>
-      </dgm:prSet>
-      <dgm:spPr/>
-    </dgm:pt>
-    <dgm:pt modelId="{B9743140-E0E9-4FC7-B806-2F253DB5A2E7}" type="pres">
-      <dgm:prSet presAssocID="{D3A25813-4F2D-41E1-816A-FC4243F4D750}" presName="spComp" presStyleCnt="0"/>
-      <dgm:spPr/>
-    </dgm:pt>
-    <dgm:pt modelId="{2EEBADC0-011B-4083-B5B7-AAB793A4B342}" type="pres">
-      <dgm:prSet presAssocID="{D3A25813-4F2D-41E1-816A-FC4243F4D750}" presName="hSp" presStyleCnt="0"/>
-      <dgm:spPr/>
-    </dgm:pt>
-    <dgm:pt modelId="{F47A2221-4B8F-471F-929F-03C37180BFB0}" type="pres">
-      <dgm:prSet presAssocID="{1106F182-F18E-428A-88CB-9E2A4F0AF130}" presName="rectComp" presStyleCnt="0"/>
-      <dgm:spPr/>
-    </dgm:pt>
-    <dgm:pt modelId="{6AC0380A-D4E4-4D98-A6DE-8B77223A12E9}" type="pres">
-      <dgm:prSet presAssocID="{1106F182-F18E-428A-88CB-9E2A4F0AF130}" presName="bgRect" presStyleLbl="bgShp" presStyleIdx="1" presStyleCnt="3"/>
-      <dgm:spPr/>
       <dgm:t>
         <a:bodyPr/>
         <a:lstStyle/>
@@ -2175,12 +2050,8 @@
         </a:p>
       </dgm:t>
     </dgm:pt>
-    <dgm:pt modelId="{5DF402F2-FA92-496F-949B-03E6A5A48B79}" type="pres">
-      <dgm:prSet presAssocID="{1106F182-F18E-428A-88CB-9E2A4F0AF130}" presName="bgRectTx" presStyleLbl="bgShp" presStyleIdx="1" presStyleCnt="3">
-        <dgm:presLayoutVars>
-          <dgm:bulletEnabled val="1"/>
-        </dgm:presLayoutVars>
-      </dgm:prSet>
+    <dgm:pt modelId="{E6353FE9-924F-409B-8F8B-B03CAD099642}" type="pres">
+      <dgm:prSet presAssocID="{5C607756-2849-4916-9E0E-1BDA1A36DFF5}" presName="connTx" presStyleLbl="parChTrans1D2" presStyleIdx="0" presStyleCnt="2"/>
       <dgm:spPr/>
       <dgm:t>
         <a:bodyPr/>
@@ -2190,6 +2061,261 @@
         </a:p>
       </dgm:t>
     </dgm:pt>
+    <dgm:pt modelId="{A7CAFE8F-A56B-414A-87DC-6CC8BDA719B9}" type="pres">
+      <dgm:prSet presAssocID="{BEF36ED1-BEBA-49C7-A6E0-254AD00AEA28}" presName="Name30" presStyleCnt="0"/>
+      <dgm:spPr/>
+    </dgm:pt>
+    <dgm:pt modelId="{1DC923BE-4EF5-42DA-8517-61665C2754EB}" type="pres">
+      <dgm:prSet presAssocID="{BEF36ED1-BEBA-49C7-A6E0-254AD00AEA28}" presName="level2Shape" presStyleLbl="node2" presStyleIdx="0" presStyleCnt="2"/>
+      <dgm:spPr/>
+      <dgm:t>
+        <a:bodyPr/>
+        <a:lstStyle/>
+        <a:p>
+          <a:endParaRPr lang="en-US"/>
+        </a:p>
+      </dgm:t>
+    </dgm:pt>
+    <dgm:pt modelId="{DD69F295-4AAF-45BA-8FF5-A0064DFE5F6B}" type="pres">
+      <dgm:prSet presAssocID="{BEF36ED1-BEBA-49C7-A6E0-254AD00AEA28}" presName="hierChild3" presStyleCnt="0"/>
+      <dgm:spPr/>
+    </dgm:pt>
+    <dgm:pt modelId="{DD8A9B2E-E296-47C0-8000-922200AD4C78}" type="pres">
+      <dgm:prSet presAssocID="{C6D946E8-DF00-4E78-A3DA-BD964E870187}" presName="Name25" presStyleLbl="parChTrans1D3" presStyleIdx="0" presStyleCnt="3"/>
+      <dgm:spPr/>
+      <dgm:t>
+        <a:bodyPr/>
+        <a:lstStyle/>
+        <a:p>
+          <a:endParaRPr lang="en-US"/>
+        </a:p>
+      </dgm:t>
+    </dgm:pt>
+    <dgm:pt modelId="{35BE477E-CFD8-4D31-AAD9-55B6FA729D69}" type="pres">
+      <dgm:prSet presAssocID="{C6D946E8-DF00-4E78-A3DA-BD964E870187}" presName="connTx" presStyleLbl="parChTrans1D3" presStyleIdx="0" presStyleCnt="3"/>
+      <dgm:spPr/>
+      <dgm:t>
+        <a:bodyPr/>
+        <a:lstStyle/>
+        <a:p>
+          <a:endParaRPr lang="en-US"/>
+        </a:p>
+      </dgm:t>
+    </dgm:pt>
+    <dgm:pt modelId="{0B88785D-C52B-4421-BACF-F1A258F794BE}" type="pres">
+      <dgm:prSet presAssocID="{E6E67D21-FB74-496F-8593-A02B9705A778}" presName="Name30" presStyleCnt="0"/>
+      <dgm:spPr/>
+    </dgm:pt>
+    <dgm:pt modelId="{D380E640-43FF-4569-83A7-3E1A450D90BB}" type="pres">
+      <dgm:prSet presAssocID="{E6E67D21-FB74-496F-8593-A02B9705A778}" presName="level2Shape" presStyleLbl="node3" presStyleIdx="0" presStyleCnt="3"/>
+      <dgm:spPr/>
+      <dgm:t>
+        <a:bodyPr/>
+        <a:lstStyle/>
+        <a:p>
+          <a:endParaRPr lang="en-US"/>
+        </a:p>
+      </dgm:t>
+    </dgm:pt>
+    <dgm:pt modelId="{CAEFEDE3-41E0-4C05-B2BF-A0D819396CA6}" type="pres">
+      <dgm:prSet presAssocID="{E6E67D21-FB74-496F-8593-A02B9705A778}" presName="hierChild3" presStyleCnt="0"/>
+      <dgm:spPr/>
+    </dgm:pt>
+    <dgm:pt modelId="{D5FA0CD8-7B13-4C06-849E-35CC554CD50E}" type="pres">
+      <dgm:prSet presAssocID="{412CFE73-26BA-4002-A64E-270752048FE0}" presName="Name25" presStyleLbl="parChTrans1D3" presStyleIdx="1" presStyleCnt="3"/>
+      <dgm:spPr/>
+      <dgm:t>
+        <a:bodyPr/>
+        <a:lstStyle/>
+        <a:p>
+          <a:endParaRPr lang="en-US"/>
+        </a:p>
+      </dgm:t>
+    </dgm:pt>
+    <dgm:pt modelId="{C09EAD11-4F9B-4FC0-AC74-E50CD152359A}" type="pres">
+      <dgm:prSet presAssocID="{412CFE73-26BA-4002-A64E-270752048FE0}" presName="connTx" presStyleLbl="parChTrans1D3" presStyleIdx="1" presStyleCnt="3"/>
+      <dgm:spPr/>
+      <dgm:t>
+        <a:bodyPr/>
+        <a:lstStyle/>
+        <a:p>
+          <a:endParaRPr lang="en-US"/>
+        </a:p>
+      </dgm:t>
+    </dgm:pt>
+    <dgm:pt modelId="{3978A8BE-2ADD-47C5-9640-4D7A684272C2}" type="pres">
+      <dgm:prSet presAssocID="{845FB137-63EF-4496-B95A-21C637112DAE}" presName="Name30" presStyleCnt="0"/>
+      <dgm:spPr/>
+    </dgm:pt>
+    <dgm:pt modelId="{D2A55942-24C2-443D-BE47-D1253E0F9BEF}" type="pres">
+      <dgm:prSet presAssocID="{845FB137-63EF-4496-B95A-21C637112DAE}" presName="level2Shape" presStyleLbl="node3" presStyleIdx="1" presStyleCnt="3"/>
+      <dgm:spPr/>
+      <dgm:t>
+        <a:bodyPr/>
+        <a:lstStyle/>
+        <a:p>
+          <a:endParaRPr lang="en-US"/>
+        </a:p>
+      </dgm:t>
+    </dgm:pt>
+    <dgm:pt modelId="{041CA751-B1DE-4744-B467-7F2CB570F30C}" type="pres">
+      <dgm:prSet presAssocID="{845FB137-63EF-4496-B95A-21C637112DAE}" presName="hierChild3" presStyleCnt="0"/>
+      <dgm:spPr/>
+    </dgm:pt>
+    <dgm:pt modelId="{C918FCEE-4612-4AC8-966D-A84A3B6E5CBB}" type="pres">
+      <dgm:prSet presAssocID="{E1D7A31C-182D-4BB0-A7CB-97ACE60F6E66}" presName="Name25" presStyleLbl="parChTrans1D2" presStyleIdx="1" presStyleCnt="2"/>
+      <dgm:spPr/>
+      <dgm:t>
+        <a:bodyPr/>
+        <a:lstStyle/>
+        <a:p>
+          <a:endParaRPr lang="en-US"/>
+        </a:p>
+      </dgm:t>
+    </dgm:pt>
+    <dgm:pt modelId="{4BB69C3D-5405-48ED-A297-7C6A2B335244}" type="pres">
+      <dgm:prSet presAssocID="{E1D7A31C-182D-4BB0-A7CB-97ACE60F6E66}" presName="connTx" presStyleLbl="parChTrans1D2" presStyleIdx="1" presStyleCnt="2"/>
+      <dgm:spPr/>
+      <dgm:t>
+        <a:bodyPr/>
+        <a:lstStyle/>
+        <a:p>
+          <a:endParaRPr lang="en-US"/>
+        </a:p>
+      </dgm:t>
+    </dgm:pt>
+    <dgm:pt modelId="{15FB57E0-A88B-4971-BCBC-D4235FC75128}" type="pres">
+      <dgm:prSet presAssocID="{FE82EA91-EA49-4952-B666-5356CDAE6BA0}" presName="Name30" presStyleCnt="0"/>
+      <dgm:spPr/>
+    </dgm:pt>
+    <dgm:pt modelId="{575ABB36-2536-4BEE-B166-1F5CAC627ED9}" type="pres">
+      <dgm:prSet presAssocID="{FE82EA91-EA49-4952-B666-5356CDAE6BA0}" presName="level2Shape" presStyleLbl="node2" presStyleIdx="1" presStyleCnt="2"/>
+      <dgm:spPr/>
+      <dgm:t>
+        <a:bodyPr/>
+        <a:lstStyle/>
+        <a:p>
+          <a:endParaRPr lang="en-US"/>
+        </a:p>
+      </dgm:t>
+    </dgm:pt>
+    <dgm:pt modelId="{E238D4A1-0990-4115-939D-D190903F2E82}" type="pres">
+      <dgm:prSet presAssocID="{FE82EA91-EA49-4952-B666-5356CDAE6BA0}" presName="hierChild3" presStyleCnt="0"/>
+      <dgm:spPr/>
+    </dgm:pt>
+    <dgm:pt modelId="{AEE26041-0EC8-4C2F-B740-B5D536742BB6}" type="pres">
+      <dgm:prSet presAssocID="{FEFB7150-D722-4B84-ADC9-46811C3E13E6}" presName="Name25" presStyleLbl="parChTrans1D3" presStyleIdx="2" presStyleCnt="3"/>
+      <dgm:spPr/>
+      <dgm:t>
+        <a:bodyPr/>
+        <a:lstStyle/>
+        <a:p>
+          <a:endParaRPr lang="en-US"/>
+        </a:p>
+      </dgm:t>
+    </dgm:pt>
+    <dgm:pt modelId="{4D3A1D79-95DD-44B1-A556-5A7B8916AE94}" type="pres">
+      <dgm:prSet presAssocID="{FEFB7150-D722-4B84-ADC9-46811C3E13E6}" presName="connTx" presStyleLbl="parChTrans1D3" presStyleIdx="2" presStyleCnt="3"/>
+      <dgm:spPr/>
+      <dgm:t>
+        <a:bodyPr/>
+        <a:lstStyle/>
+        <a:p>
+          <a:endParaRPr lang="en-US"/>
+        </a:p>
+      </dgm:t>
+    </dgm:pt>
+    <dgm:pt modelId="{22A1CC9C-E777-4D21-B3EF-148029B59D07}" type="pres">
+      <dgm:prSet presAssocID="{8FF50655-8487-4B4E-B83D-4F0AF1FA252E}" presName="Name30" presStyleCnt="0"/>
+      <dgm:spPr/>
+    </dgm:pt>
+    <dgm:pt modelId="{87630057-8D34-4E32-9EA4-2707D2D0D058}" type="pres">
+      <dgm:prSet presAssocID="{8FF50655-8487-4B4E-B83D-4F0AF1FA252E}" presName="level2Shape" presStyleLbl="node3" presStyleIdx="2" presStyleCnt="3"/>
+      <dgm:spPr/>
+      <dgm:t>
+        <a:bodyPr/>
+        <a:lstStyle/>
+        <a:p>
+          <a:endParaRPr lang="en-US"/>
+        </a:p>
+      </dgm:t>
+    </dgm:pt>
+    <dgm:pt modelId="{C085690A-2679-4356-BD20-6CE4D79A02D4}" type="pres">
+      <dgm:prSet presAssocID="{8FF50655-8487-4B4E-B83D-4F0AF1FA252E}" presName="hierChild3" presStyleCnt="0"/>
+      <dgm:spPr/>
+    </dgm:pt>
+    <dgm:pt modelId="{7EEF3A8F-B83C-4047-AE77-EE130ABA78EB}" type="pres">
+      <dgm:prSet presAssocID="{6C26E894-0E63-459F-9B14-2012EE98C7C8}" presName="bgShapesFlow" presStyleCnt="0"/>
+      <dgm:spPr/>
+    </dgm:pt>
+    <dgm:pt modelId="{F65D6DE6-AD75-4DF0-AB27-E72FC137C2DC}" type="pres">
+      <dgm:prSet presAssocID="{D3A25813-4F2D-41E1-816A-FC4243F4D750}" presName="rectComp" presStyleCnt="0"/>
+      <dgm:spPr/>
+    </dgm:pt>
+    <dgm:pt modelId="{5BD92FB9-5AB2-423A-8E1A-8FD678F75648}" type="pres">
+      <dgm:prSet presAssocID="{D3A25813-4F2D-41E1-816A-FC4243F4D750}" presName="bgRect" presStyleLbl="bgShp" presStyleIdx="0" presStyleCnt="3"/>
+      <dgm:spPr/>
+      <dgm:t>
+        <a:bodyPr/>
+        <a:lstStyle/>
+        <a:p>
+          <a:endParaRPr lang="en-US"/>
+        </a:p>
+      </dgm:t>
+    </dgm:pt>
+    <dgm:pt modelId="{388B4181-C1FC-4A5B-9FDD-B8B75DDAAF2F}" type="pres">
+      <dgm:prSet presAssocID="{D3A25813-4F2D-41E1-816A-FC4243F4D750}" presName="bgRectTx" presStyleLbl="bgShp" presStyleIdx="0" presStyleCnt="3">
+        <dgm:presLayoutVars>
+          <dgm:bulletEnabled val="1"/>
+        </dgm:presLayoutVars>
+      </dgm:prSet>
+      <dgm:spPr/>
+      <dgm:t>
+        <a:bodyPr/>
+        <a:lstStyle/>
+        <a:p>
+          <a:endParaRPr lang="en-US"/>
+        </a:p>
+      </dgm:t>
+    </dgm:pt>
+    <dgm:pt modelId="{B9743140-E0E9-4FC7-B806-2F253DB5A2E7}" type="pres">
+      <dgm:prSet presAssocID="{D3A25813-4F2D-41E1-816A-FC4243F4D750}" presName="spComp" presStyleCnt="0"/>
+      <dgm:spPr/>
+    </dgm:pt>
+    <dgm:pt modelId="{2EEBADC0-011B-4083-B5B7-AAB793A4B342}" type="pres">
+      <dgm:prSet presAssocID="{D3A25813-4F2D-41E1-816A-FC4243F4D750}" presName="hSp" presStyleCnt="0"/>
+      <dgm:spPr/>
+    </dgm:pt>
+    <dgm:pt modelId="{F47A2221-4B8F-471F-929F-03C37180BFB0}" type="pres">
+      <dgm:prSet presAssocID="{1106F182-F18E-428A-88CB-9E2A4F0AF130}" presName="rectComp" presStyleCnt="0"/>
+      <dgm:spPr/>
+    </dgm:pt>
+    <dgm:pt modelId="{6AC0380A-D4E4-4D98-A6DE-8B77223A12E9}" type="pres">
+      <dgm:prSet presAssocID="{1106F182-F18E-428A-88CB-9E2A4F0AF130}" presName="bgRect" presStyleLbl="bgShp" presStyleIdx="1" presStyleCnt="3"/>
+      <dgm:spPr/>
+      <dgm:t>
+        <a:bodyPr/>
+        <a:lstStyle/>
+        <a:p>
+          <a:endParaRPr lang="en-US"/>
+        </a:p>
+      </dgm:t>
+    </dgm:pt>
+    <dgm:pt modelId="{5DF402F2-FA92-496F-949B-03E6A5A48B79}" type="pres">
+      <dgm:prSet presAssocID="{1106F182-F18E-428A-88CB-9E2A4F0AF130}" presName="bgRectTx" presStyleLbl="bgShp" presStyleIdx="1" presStyleCnt="3">
+        <dgm:presLayoutVars>
+          <dgm:bulletEnabled val="1"/>
+        </dgm:presLayoutVars>
+      </dgm:prSet>
+      <dgm:spPr/>
+      <dgm:t>
+        <a:bodyPr/>
+        <a:lstStyle/>
+        <a:p>
+          <a:endParaRPr lang="en-US"/>
+        </a:p>
+      </dgm:t>
+    </dgm:pt>
     <dgm:pt modelId="{D4C2B9ED-BC79-4555-8101-B319295B46A7}" type="pres">
       <dgm:prSet presAssocID="{1106F182-F18E-428A-88CB-9E2A4F0AF130}" presName="spComp" presStyleCnt="0"/>
       <dgm:spPr/>
@@ -2205,6 +2331,13 @@
     <dgm:pt modelId="{52588206-222C-452E-B875-DD3F66C6482F}" type="pres">
       <dgm:prSet presAssocID="{20C2B600-3431-49B4-A9B6-E162F7CACDDD}" presName="bgRect" presStyleLbl="bgShp" presStyleIdx="2" presStyleCnt="3"/>
       <dgm:spPr/>
+      <dgm:t>
+        <a:bodyPr/>
+        <a:lstStyle/>
+        <a:p>
+          <a:endParaRPr lang="en-US"/>
+        </a:p>
+      </dgm:t>
     </dgm:pt>
     <dgm:pt modelId="{57BE5FDB-5306-4A05-9ABC-ED943B62E6D5}" type="pres">
       <dgm:prSet presAssocID="{20C2B600-3431-49B4-A9B6-E162F7CACDDD}" presName="bgRectTx" presStyleLbl="bgShp" presStyleIdx="2" presStyleCnt="3">
@@ -2213,41 +2346,48 @@
         </dgm:presLayoutVars>
       </dgm:prSet>
       <dgm:spPr/>
+      <dgm:t>
+        <a:bodyPr/>
+        <a:lstStyle/>
+        <a:p>
+          <a:endParaRPr lang="en-US"/>
+        </a:p>
+      </dgm:t>
     </dgm:pt>
   </dgm:ptLst>
   <dgm:cxnLst>
+    <dgm:cxn modelId="{C518F25B-F38E-40D9-BB34-32F36664B234}" type="presOf" srcId="{FE82EA91-EA49-4952-B666-5356CDAE6BA0}" destId="{575ABB36-2536-4BEE-B166-1F5CAC627ED9}" srcOrd="0" destOrd="0" presId="urn:microsoft.com/office/officeart/2005/8/layout/hierarchy5"/>
+    <dgm:cxn modelId="{702D694B-F98A-44A4-801E-EF56DD4287ED}" srcId="{ACD2127B-4B9A-4639-BB6A-19F7E5DD0C00}" destId="{FE82EA91-EA49-4952-B666-5356CDAE6BA0}" srcOrd="1" destOrd="0" parTransId="{E1D7A31C-182D-4BB0-A7CB-97ACE60F6E66}" sibTransId="{78F2B5A7-6A60-45D8-ACBE-C404C2030959}"/>
+    <dgm:cxn modelId="{A8187BB7-350E-4EA2-A86A-4B708FE0671E}" type="presOf" srcId="{412CFE73-26BA-4002-A64E-270752048FE0}" destId="{C09EAD11-4F9B-4FC0-AC74-E50CD152359A}" srcOrd="1" destOrd="0" presId="urn:microsoft.com/office/officeart/2005/8/layout/hierarchy5"/>
+    <dgm:cxn modelId="{9523A8D7-1524-4E45-8D64-22F87BEA6E06}" srcId="{BEF36ED1-BEBA-49C7-A6E0-254AD00AEA28}" destId="{845FB137-63EF-4496-B95A-21C637112DAE}" srcOrd="1" destOrd="0" parTransId="{412CFE73-26BA-4002-A64E-270752048FE0}" sibTransId="{F45864D8-34BC-41C9-9282-A56D7327FBED}"/>
+    <dgm:cxn modelId="{CB7F50D8-DD1C-4064-8BC8-1408BDE03138}" srcId="{6C26E894-0E63-459F-9B14-2012EE98C7C8}" destId="{20C2B600-3431-49B4-A9B6-E162F7CACDDD}" srcOrd="3" destOrd="0" parTransId="{8786C7F9-220A-4B35-970D-820A8434F888}" sibTransId="{E5CE530A-76E5-45F9-9843-20EB6A14FC86}"/>
+    <dgm:cxn modelId="{8EE6B103-9F34-428D-94B4-2622F94C29C3}" type="presOf" srcId="{E1D7A31C-182D-4BB0-A7CB-97ACE60F6E66}" destId="{C918FCEE-4612-4AC8-966D-A84A3B6E5CBB}" srcOrd="0" destOrd="0" presId="urn:microsoft.com/office/officeart/2005/8/layout/hierarchy5"/>
+    <dgm:cxn modelId="{ACA7549B-129B-4469-955E-0E1FCF8E88D6}" type="presOf" srcId="{FEFB7150-D722-4B84-ADC9-46811C3E13E6}" destId="{AEE26041-0EC8-4C2F-B740-B5D536742BB6}" srcOrd="0" destOrd="0" presId="urn:microsoft.com/office/officeart/2005/8/layout/hierarchy5"/>
+    <dgm:cxn modelId="{1EF54BCD-112E-4FA3-A29C-6718BAA98024}" type="presOf" srcId="{5C607756-2849-4916-9E0E-1BDA1A36DFF5}" destId="{E6353FE9-924F-409B-8F8B-B03CAD099642}" srcOrd="1" destOrd="0" presId="urn:microsoft.com/office/officeart/2005/8/layout/hierarchy5"/>
     <dgm:cxn modelId="{27DD580A-009F-41D6-8550-1940AF3BA3EE}" type="presOf" srcId="{FEFB7150-D722-4B84-ADC9-46811C3E13E6}" destId="{4D3A1D79-95DD-44B1-A556-5A7B8916AE94}" srcOrd="1" destOrd="0" presId="urn:microsoft.com/office/officeart/2005/8/layout/hierarchy5"/>
-    <dgm:cxn modelId="{571FC3BB-820D-42E0-855E-8335449F698B}" type="presOf" srcId="{D3A25813-4F2D-41E1-816A-FC4243F4D750}" destId="{388B4181-C1FC-4A5B-9FDD-B8B75DDAAF2F}" srcOrd="1" destOrd="0" presId="urn:microsoft.com/office/officeart/2005/8/layout/hierarchy5"/>
+    <dgm:cxn modelId="{D07AFE75-213A-45C0-8C8C-C03221C56089}" type="presOf" srcId="{412CFE73-26BA-4002-A64E-270752048FE0}" destId="{D5FA0CD8-7B13-4C06-849E-35CC554CD50E}" srcOrd="0" destOrd="0" presId="urn:microsoft.com/office/officeart/2005/8/layout/hierarchy5"/>
+    <dgm:cxn modelId="{2ADF8A12-B04C-42FD-BC38-433496C88C06}" srcId="{6C26E894-0E63-459F-9B14-2012EE98C7C8}" destId="{ACD2127B-4B9A-4639-BB6A-19F7E5DD0C00}" srcOrd="0" destOrd="0" parTransId="{D809DB2A-79AD-4D41-A1BD-B2354295AB9C}" sibTransId="{D0D60AD9-8C25-45AF-B307-85F4AD12FB5F}"/>
+    <dgm:cxn modelId="{D5BB9F66-2445-4665-B3A9-15DDC6A452C6}" type="presOf" srcId="{845FB137-63EF-4496-B95A-21C637112DAE}" destId="{D2A55942-24C2-443D-BE47-D1253E0F9BEF}" srcOrd="0" destOrd="0" presId="urn:microsoft.com/office/officeart/2005/8/layout/hierarchy5"/>
+    <dgm:cxn modelId="{4CF5BF04-C411-43A5-8B6B-9D035F6D62E4}" type="presOf" srcId="{1106F182-F18E-428A-88CB-9E2A4F0AF130}" destId="{6AC0380A-D4E4-4D98-A6DE-8B77223A12E9}" srcOrd="0" destOrd="0" presId="urn:microsoft.com/office/officeart/2005/8/layout/hierarchy5"/>
     <dgm:cxn modelId="{CA5F2454-58FF-4EB6-9D45-0BCC32FC54B0}" srcId="{6C26E894-0E63-459F-9B14-2012EE98C7C8}" destId="{D3A25813-4F2D-41E1-816A-FC4243F4D750}" srcOrd="1" destOrd="0" parTransId="{8126AB85-A7E8-4F33-B6A2-5FE042AB2479}" sibTransId="{91A9E03C-29B3-4026-9BE1-8F868E765F9D}"/>
     <dgm:cxn modelId="{547499F0-EC95-44E4-8C33-CC53950A66F1}" type="presOf" srcId="{20C2B600-3431-49B4-A9B6-E162F7CACDDD}" destId="{57BE5FDB-5306-4A05-9ABC-ED943B62E6D5}" srcOrd="1" destOrd="0" presId="urn:microsoft.com/office/officeart/2005/8/layout/hierarchy5"/>
-    <dgm:cxn modelId="{9523A8D7-1524-4E45-8D64-22F87BEA6E06}" srcId="{BEF36ED1-BEBA-49C7-A6E0-254AD00AEA28}" destId="{845FB137-63EF-4496-B95A-21C637112DAE}" srcOrd="1" destOrd="0" parTransId="{412CFE73-26BA-4002-A64E-270752048FE0}" sibTransId="{F45864D8-34BC-41C9-9282-A56D7327FBED}"/>
+    <dgm:cxn modelId="{52D07327-AA43-4379-BC95-E252CF672B32}" type="presOf" srcId="{D3A25813-4F2D-41E1-816A-FC4243F4D750}" destId="{5BD92FB9-5AB2-423A-8E1A-8FD678F75648}" srcOrd="0" destOrd="0" presId="urn:microsoft.com/office/officeart/2005/8/layout/hierarchy5"/>
+    <dgm:cxn modelId="{B87698BE-9763-438D-9B8C-3F1439743BE8}" type="presOf" srcId="{8FF50655-8487-4B4E-B83D-4F0AF1FA252E}" destId="{87630057-8D34-4E32-9EA4-2707D2D0D058}" srcOrd="0" destOrd="0" presId="urn:microsoft.com/office/officeart/2005/8/layout/hierarchy5"/>
+    <dgm:cxn modelId="{CEFB440D-53E4-4A54-937D-F066797DE96B}" type="presOf" srcId="{ACD2127B-4B9A-4639-BB6A-19F7E5DD0C00}" destId="{79DBC7F8-2F1E-4572-BB3B-4AE2F88AB81E}" srcOrd="0" destOrd="0" presId="urn:microsoft.com/office/officeart/2005/8/layout/hierarchy5"/>
     <dgm:cxn modelId="{81E6E24C-02BE-415A-8EC2-F2EA0D7635AF}" srcId="{ACD2127B-4B9A-4639-BB6A-19F7E5DD0C00}" destId="{BEF36ED1-BEBA-49C7-A6E0-254AD00AEA28}" srcOrd="0" destOrd="0" parTransId="{5C607756-2849-4916-9E0E-1BDA1A36DFF5}" sibTransId="{58F36A08-2187-4A59-8583-FFF511B0781F}"/>
-    <dgm:cxn modelId="{ACA7549B-129B-4469-955E-0E1FCF8E88D6}" type="presOf" srcId="{FEFB7150-D722-4B84-ADC9-46811C3E13E6}" destId="{AEE26041-0EC8-4C2F-B740-B5D536742BB6}" srcOrd="0" destOrd="0" presId="urn:microsoft.com/office/officeart/2005/8/layout/hierarchy5"/>
-    <dgm:cxn modelId="{52D07327-AA43-4379-BC95-E252CF672B32}" type="presOf" srcId="{D3A25813-4F2D-41E1-816A-FC4243F4D750}" destId="{5BD92FB9-5AB2-423A-8E1A-8FD678F75648}" srcOrd="0" destOrd="0" presId="urn:microsoft.com/office/officeart/2005/8/layout/hierarchy5"/>
-    <dgm:cxn modelId="{4CF5BF04-C411-43A5-8B6B-9D035F6D62E4}" type="presOf" srcId="{1106F182-F18E-428A-88CB-9E2A4F0AF130}" destId="{6AC0380A-D4E4-4D98-A6DE-8B77223A12E9}" srcOrd="0" destOrd="0" presId="urn:microsoft.com/office/officeart/2005/8/layout/hierarchy5"/>
-    <dgm:cxn modelId="{B87698BE-9763-438D-9B8C-3F1439743BE8}" type="presOf" srcId="{8FF50655-8487-4B4E-B83D-4F0AF1FA252E}" destId="{87630057-8D34-4E32-9EA4-2707D2D0D058}" srcOrd="0" destOrd="0" presId="urn:microsoft.com/office/officeart/2005/8/layout/hierarchy5"/>
+    <dgm:cxn modelId="{C8E052EF-7B3C-4538-87AD-3A0D5155AD05}" type="presOf" srcId="{E6E67D21-FB74-496F-8593-A02B9705A778}" destId="{D380E640-43FF-4569-83A7-3E1A450D90BB}" srcOrd="0" destOrd="0" presId="urn:microsoft.com/office/officeart/2005/8/layout/hierarchy5"/>
+    <dgm:cxn modelId="{2F587E15-89D8-402D-BDF4-FFAFB70BC601}" type="presOf" srcId="{6C26E894-0E63-459F-9B14-2012EE98C7C8}" destId="{F0513EC2-DFA4-41F0-B8E4-6E12E64D3A27}" srcOrd="0" destOrd="0" presId="urn:microsoft.com/office/officeart/2005/8/layout/hierarchy5"/>
+    <dgm:cxn modelId="{A52EBCB3-8713-4795-AA36-B734824E0371}" srcId="{BEF36ED1-BEBA-49C7-A6E0-254AD00AEA28}" destId="{E6E67D21-FB74-496F-8593-A02B9705A778}" srcOrd="0" destOrd="0" parTransId="{C6D946E8-DF00-4E78-A3DA-BD964E870187}" sibTransId="{9C1D15F9-7D67-40A5-82D5-78F7EC06DB99}"/>
+    <dgm:cxn modelId="{D4F99EBA-2002-4F3D-934F-8966CC02D4FD}" type="presOf" srcId="{1106F182-F18E-428A-88CB-9E2A4F0AF130}" destId="{5DF402F2-FA92-496F-949B-03E6A5A48B79}" srcOrd="1" destOrd="0" presId="urn:microsoft.com/office/officeart/2005/8/layout/hierarchy5"/>
+    <dgm:cxn modelId="{DC5F8F5A-304E-4846-8F3D-EDD390A13A89}" srcId="{FE82EA91-EA49-4952-B666-5356CDAE6BA0}" destId="{8FF50655-8487-4B4E-B83D-4F0AF1FA252E}" srcOrd="0" destOrd="0" parTransId="{FEFB7150-D722-4B84-ADC9-46811C3E13E6}" sibTransId="{100C9CE5-7415-4B27-BE93-3DEDA3A67A60}"/>
+    <dgm:cxn modelId="{543B235A-D9EF-41A9-85C6-B3046D68F54F}" srcId="{6C26E894-0E63-459F-9B14-2012EE98C7C8}" destId="{1106F182-F18E-428A-88CB-9E2A4F0AF130}" srcOrd="2" destOrd="0" parTransId="{6D6A0EFB-0267-4EF8-B4D7-66B54BE7F426}" sibTransId="{6E901D27-F2AE-4BE1-90A9-EC5A0C8EF515}"/>
+    <dgm:cxn modelId="{AEE2A324-619A-4C35-8867-B2287FD2D8C6}" type="presOf" srcId="{20C2B600-3431-49B4-A9B6-E162F7CACDDD}" destId="{52588206-222C-452E-B875-DD3F66C6482F}" srcOrd="0" destOrd="0" presId="urn:microsoft.com/office/officeart/2005/8/layout/hierarchy5"/>
+    <dgm:cxn modelId="{A891AA8A-FBBE-47FE-ABDE-27F6B75FD1FC}" type="presOf" srcId="{C6D946E8-DF00-4E78-A3DA-BD964E870187}" destId="{DD8A9B2E-E296-47C0-8000-922200AD4C78}" srcOrd="0" destOrd="0" presId="urn:microsoft.com/office/officeart/2005/8/layout/hierarchy5"/>
+    <dgm:cxn modelId="{A7DCA82D-C316-4182-AFB0-135A8F8D9195}" type="presOf" srcId="{BEF36ED1-BEBA-49C7-A6E0-254AD00AEA28}" destId="{1DC923BE-4EF5-42DA-8517-61665C2754EB}" srcOrd="0" destOrd="0" presId="urn:microsoft.com/office/officeart/2005/8/layout/hierarchy5"/>
+    <dgm:cxn modelId="{140990FF-4501-4C26-9DD1-4E8329FAA73E}" type="presOf" srcId="{5C607756-2849-4916-9E0E-1BDA1A36DFF5}" destId="{D288014C-3523-4477-B75E-1FCECF49E873}" srcOrd="0" destOrd="0" presId="urn:microsoft.com/office/officeart/2005/8/layout/hierarchy5"/>
+    <dgm:cxn modelId="{571FC3BB-820D-42E0-855E-8335449F698B}" type="presOf" srcId="{D3A25813-4F2D-41E1-816A-FC4243F4D750}" destId="{388B4181-C1FC-4A5B-9FDD-B8B75DDAAF2F}" srcOrd="1" destOrd="0" presId="urn:microsoft.com/office/officeart/2005/8/layout/hierarchy5"/>
     <dgm:cxn modelId="{AF8F1126-A555-40A6-B747-06047B33C84E}" type="presOf" srcId="{E1D7A31C-182D-4BB0-A7CB-97ACE60F6E66}" destId="{4BB69C3D-5405-48ED-A297-7C6A2B335244}" srcOrd="1" destOrd="0" presId="urn:microsoft.com/office/officeart/2005/8/layout/hierarchy5"/>
-    <dgm:cxn modelId="{CEFB440D-53E4-4A54-937D-F066797DE96B}" type="presOf" srcId="{ACD2127B-4B9A-4639-BB6A-19F7E5DD0C00}" destId="{79DBC7F8-2F1E-4572-BB3B-4AE2F88AB81E}" srcOrd="0" destOrd="0" presId="urn:microsoft.com/office/officeart/2005/8/layout/hierarchy5"/>
-    <dgm:cxn modelId="{140990FF-4501-4C26-9DD1-4E8329FAA73E}" type="presOf" srcId="{5C607756-2849-4916-9E0E-1BDA1A36DFF5}" destId="{D288014C-3523-4477-B75E-1FCECF49E873}" srcOrd="0" destOrd="0" presId="urn:microsoft.com/office/officeart/2005/8/layout/hierarchy5"/>
-    <dgm:cxn modelId="{C518F25B-F38E-40D9-BB34-32F36664B234}" type="presOf" srcId="{FE82EA91-EA49-4952-B666-5356CDAE6BA0}" destId="{575ABB36-2536-4BEE-B166-1F5CAC627ED9}" srcOrd="0" destOrd="0" presId="urn:microsoft.com/office/officeart/2005/8/layout/hierarchy5"/>
-    <dgm:cxn modelId="{C8E052EF-7B3C-4538-87AD-3A0D5155AD05}" type="presOf" srcId="{E6E67D21-FB74-496F-8593-A02B9705A778}" destId="{D380E640-43FF-4569-83A7-3E1A450D90BB}" srcOrd="0" destOrd="0" presId="urn:microsoft.com/office/officeart/2005/8/layout/hierarchy5"/>
-    <dgm:cxn modelId="{A891AA8A-FBBE-47FE-ABDE-27F6B75FD1FC}" type="presOf" srcId="{C6D946E8-DF00-4E78-A3DA-BD964E870187}" destId="{DD8A9B2E-E296-47C0-8000-922200AD4C78}" srcOrd="0" destOrd="0" presId="urn:microsoft.com/office/officeart/2005/8/layout/hierarchy5"/>
-    <dgm:cxn modelId="{DC5F8F5A-304E-4846-8F3D-EDD390A13A89}" srcId="{FE82EA91-EA49-4952-B666-5356CDAE6BA0}" destId="{8FF50655-8487-4B4E-B83D-4F0AF1FA252E}" srcOrd="0" destOrd="0" parTransId="{FEFB7150-D722-4B84-ADC9-46811C3E13E6}" sibTransId="{100C9CE5-7415-4B27-BE93-3DEDA3A67A60}"/>
-    <dgm:cxn modelId="{D07AFE75-213A-45C0-8C8C-C03221C56089}" type="presOf" srcId="{412CFE73-26BA-4002-A64E-270752048FE0}" destId="{D5FA0CD8-7B13-4C06-849E-35CC554CD50E}" srcOrd="0" destOrd="0" presId="urn:microsoft.com/office/officeart/2005/8/layout/hierarchy5"/>
-    <dgm:cxn modelId="{CB7F50D8-DD1C-4064-8BC8-1408BDE03138}" srcId="{6C26E894-0E63-459F-9B14-2012EE98C7C8}" destId="{20C2B600-3431-49B4-A9B6-E162F7CACDDD}" srcOrd="3" destOrd="0" parTransId="{8786C7F9-220A-4B35-970D-820A8434F888}" sibTransId="{E5CE530A-76E5-45F9-9843-20EB6A14FC86}"/>
-    <dgm:cxn modelId="{A52EBCB3-8713-4795-AA36-B734824E0371}" srcId="{BEF36ED1-BEBA-49C7-A6E0-254AD00AEA28}" destId="{E6E67D21-FB74-496F-8593-A02B9705A778}" srcOrd="0" destOrd="0" parTransId="{C6D946E8-DF00-4E78-A3DA-BD964E870187}" sibTransId="{9C1D15F9-7D67-40A5-82D5-78F7EC06DB99}"/>
-    <dgm:cxn modelId="{8EE6B103-9F34-428D-94B4-2622F94C29C3}" type="presOf" srcId="{E1D7A31C-182D-4BB0-A7CB-97ACE60F6E66}" destId="{C918FCEE-4612-4AC8-966D-A84A3B6E5CBB}" srcOrd="0" destOrd="0" presId="urn:microsoft.com/office/officeart/2005/8/layout/hierarchy5"/>
     <dgm:cxn modelId="{2D70377D-450E-4314-8BB7-C7DE2EA014AF}" type="presOf" srcId="{C6D946E8-DF00-4E78-A3DA-BD964E870187}" destId="{35BE477E-CFD8-4D31-AAD9-55B6FA729D69}" srcOrd="1" destOrd="0" presId="urn:microsoft.com/office/officeart/2005/8/layout/hierarchy5"/>
-    <dgm:cxn modelId="{AEE2A324-619A-4C35-8867-B2287FD2D8C6}" type="presOf" srcId="{20C2B600-3431-49B4-A9B6-E162F7CACDDD}" destId="{52588206-222C-452E-B875-DD3F66C6482F}" srcOrd="0" destOrd="0" presId="urn:microsoft.com/office/officeart/2005/8/layout/hierarchy5"/>
-    <dgm:cxn modelId="{A8187BB7-350E-4EA2-A86A-4B708FE0671E}" type="presOf" srcId="{412CFE73-26BA-4002-A64E-270752048FE0}" destId="{C09EAD11-4F9B-4FC0-AC74-E50CD152359A}" srcOrd="1" destOrd="0" presId="urn:microsoft.com/office/officeart/2005/8/layout/hierarchy5"/>
-    <dgm:cxn modelId="{2F587E15-89D8-402D-BDF4-FFAFB70BC601}" type="presOf" srcId="{6C26E894-0E63-459F-9B14-2012EE98C7C8}" destId="{F0513EC2-DFA4-41F0-B8E4-6E12E64D3A27}" srcOrd="0" destOrd="0" presId="urn:microsoft.com/office/officeart/2005/8/layout/hierarchy5"/>
-    <dgm:cxn modelId="{1EF54BCD-112E-4FA3-A29C-6718BAA98024}" type="presOf" srcId="{5C607756-2849-4916-9E0E-1BDA1A36DFF5}" destId="{E6353FE9-924F-409B-8F8B-B03CAD099642}" srcOrd="1" destOrd="0" presId="urn:microsoft.com/office/officeart/2005/8/layout/hierarchy5"/>
-    <dgm:cxn modelId="{543B235A-D9EF-41A9-85C6-B3046D68F54F}" srcId="{6C26E894-0E63-459F-9B14-2012EE98C7C8}" destId="{1106F182-F18E-428A-88CB-9E2A4F0AF130}" srcOrd="2" destOrd="0" parTransId="{6D6A0EFB-0267-4EF8-B4D7-66B54BE7F426}" sibTransId="{6E901D27-F2AE-4BE1-90A9-EC5A0C8EF515}"/>
-    <dgm:cxn modelId="{D5BB9F66-2445-4665-B3A9-15DDC6A452C6}" type="presOf" srcId="{845FB137-63EF-4496-B95A-21C637112DAE}" destId="{D2A55942-24C2-443D-BE47-D1253E0F9BEF}" srcOrd="0" destOrd="0" presId="urn:microsoft.com/office/officeart/2005/8/layout/hierarchy5"/>
-    <dgm:cxn modelId="{702D694B-F98A-44A4-801E-EF56DD4287ED}" srcId="{ACD2127B-4B9A-4639-BB6A-19F7E5DD0C00}" destId="{FE82EA91-EA49-4952-B666-5356CDAE6BA0}" srcOrd="1" destOrd="0" parTransId="{E1D7A31C-182D-4BB0-A7CB-97ACE60F6E66}" sibTransId="{78F2B5A7-6A60-45D8-ACBE-C404C2030959}"/>
-    <dgm:cxn modelId="{D4F99EBA-2002-4F3D-934F-8966CC02D4FD}" type="presOf" srcId="{1106F182-F18E-428A-88CB-9E2A4F0AF130}" destId="{5DF402F2-FA92-496F-949B-03E6A5A48B79}" srcOrd="1" destOrd="0" presId="urn:microsoft.com/office/officeart/2005/8/layout/hierarchy5"/>
-    <dgm:cxn modelId="{A7DCA82D-C316-4182-AFB0-135A8F8D9195}" type="presOf" srcId="{BEF36ED1-BEBA-49C7-A6E0-254AD00AEA28}" destId="{1DC923BE-4EF5-42DA-8517-61665C2754EB}" srcOrd="0" destOrd="0" presId="urn:microsoft.com/office/officeart/2005/8/layout/hierarchy5"/>
-    <dgm:cxn modelId="{2ADF8A12-B04C-42FD-BC38-433496C88C06}" srcId="{6C26E894-0E63-459F-9B14-2012EE98C7C8}" destId="{ACD2127B-4B9A-4639-BB6A-19F7E5DD0C00}" srcOrd="0" destOrd="0" parTransId="{D809DB2A-79AD-4D41-A1BD-B2354295AB9C}" sibTransId="{D0D60AD9-8C25-45AF-B307-85F4AD12FB5F}"/>
     <dgm:cxn modelId="{7112423E-C12E-4849-9FDE-09F447D97AE8}" type="presParOf" srcId="{F0513EC2-DFA4-41F0-B8E4-6E12E64D3A27}" destId="{9C383881-4922-469A-875E-FF0AB0471C3C}" srcOrd="0" destOrd="0" presId="urn:microsoft.com/office/officeart/2005/8/layout/hierarchy5"/>
     <dgm:cxn modelId="{7D8BB080-AA97-41AB-BD51-831B044BA328}" type="presParOf" srcId="{9C383881-4922-469A-875E-FF0AB0471C3C}" destId="{E93A7849-3A72-42A4-90DC-AF5F33B97B1B}" srcOrd="0" destOrd="0" presId="urn:microsoft.com/office/officeart/2005/8/layout/hierarchy5"/>
     <dgm:cxn modelId="{38A83E6A-D51E-495A-A273-84182CE5AA1D}" type="presParOf" srcId="{9C383881-4922-469A-875E-FF0AB0471C3C}" destId="{D6DCCA4B-7D46-44C1-BBDD-2F5EDA462FD2}" srcOrd="1" destOrd="0" presId="urn:microsoft.com/office/officeart/2005/8/layout/hierarchy5"/>
@@ -2662,6 +2802,13 @@
         </dgm:presLayoutVars>
       </dgm:prSet>
       <dgm:spPr/>
+      <dgm:t>
+        <a:bodyPr/>
+        <a:lstStyle/>
+        <a:p>
+          <a:endParaRPr lang="en-US"/>
+        </a:p>
+      </dgm:t>
     </dgm:pt>
     <dgm:pt modelId="{CF3419D7-81E0-4231-961E-845616240217}" type="pres">
       <dgm:prSet presAssocID="{BB47D064-290C-4CF4-B928-C06CAA41DE21}" presName="hierFlow" presStyleCnt="0"/>
@@ -2707,78 +2854,6 @@
     <dgm:pt modelId="{8394F2BF-239D-4AEE-8A3E-8F5BFC66898A}" type="pres">
       <dgm:prSet presAssocID="{FC9CEC5D-EFAF-4C5D-8EE7-9B64DE26A74A}" presName="Name25" presStyleLbl="parChTrans1D2" presStyleIdx="0" presStyleCnt="2"/>
       <dgm:spPr/>
-    </dgm:pt>
-    <dgm:pt modelId="{40CA99EB-A8C7-4C4F-902D-2F4D1AB0EF7B}" type="pres">
-      <dgm:prSet presAssocID="{FC9CEC5D-EFAF-4C5D-8EE7-9B64DE26A74A}" presName="connTx" presStyleLbl="parChTrans1D2" presStyleIdx="0" presStyleCnt="2"/>
-      <dgm:spPr/>
-    </dgm:pt>
-    <dgm:pt modelId="{6E3D0FDE-1CC1-4A02-A7D6-90E104EB42D6}" type="pres">
-      <dgm:prSet presAssocID="{3D2C7853-AFBC-4389-8FF1-94A6C4CC512B}" presName="Name30" presStyleCnt="0"/>
-      <dgm:spPr/>
-    </dgm:pt>
-    <dgm:pt modelId="{5605A27C-E0DA-4DC6-B669-C9FCEB55EC46}" type="pres">
-      <dgm:prSet presAssocID="{3D2C7853-AFBC-4389-8FF1-94A6C4CC512B}" presName="level2Shape" presStyleLbl="node2" presStyleIdx="0" presStyleCnt="2"/>
-      <dgm:spPr/>
-    </dgm:pt>
-    <dgm:pt modelId="{400077A6-AA09-4DE0-904F-DB1A09607E8B}" type="pres">
-      <dgm:prSet presAssocID="{3D2C7853-AFBC-4389-8FF1-94A6C4CC512B}" presName="hierChild3" presStyleCnt="0"/>
-      <dgm:spPr/>
-    </dgm:pt>
-    <dgm:pt modelId="{D93E91CC-5971-400C-9645-3CE8160C8269}" type="pres">
-      <dgm:prSet presAssocID="{0F373F17-DDC8-43A9-98AB-21B1D2B076ED}" presName="Name25" presStyleLbl="parChTrans1D3" presStyleIdx="0" presStyleCnt="3"/>
-      <dgm:spPr/>
-    </dgm:pt>
-    <dgm:pt modelId="{9868EC7E-9FF4-4611-9DC7-C52D47ADDF26}" type="pres">
-      <dgm:prSet presAssocID="{0F373F17-DDC8-43A9-98AB-21B1D2B076ED}" presName="connTx" presStyleLbl="parChTrans1D3" presStyleIdx="0" presStyleCnt="3"/>
-      <dgm:spPr/>
-    </dgm:pt>
-    <dgm:pt modelId="{5242BDEA-1CCB-42EB-AD6A-1A687B03B294}" type="pres">
-      <dgm:prSet presAssocID="{E0F4CF46-513A-44AF-A021-62688F438A54}" presName="Name30" presStyleCnt="0"/>
-      <dgm:spPr/>
-    </dgm:pt>
-    <dgm:pt modelId="{ECA487D3-8B1A-4685-91DB-4D0D21D0AAC3}" type="pres">
-      <dgm:prSet presAssocID="{E0F4CF46-513A-44AF-A021-62688F438A54}" presName="level2Shape" presStyleLbl="node3" presStyleIdx="0" presStyleCnt="3"/>
-      <dgm:spPr/>
-    </dgm:pt>
-    <dgm:pt modelId="{7B53D306-C06C-43C3-9F2B-C556EC912A03}" type="pres">
-      <dgm:prSet presAssocID="{E0F4CF46-513A-44AF-A021-62688F438A54}" presName="hierChild3" presStyleCnt="0"/>
-      <dgm:spPr/>
-    </dgm:pt>
-    <dgm:pt modelId="{E588BB08-9230-4AE3-B029-9FDFC1829342}" type="pres">
-      <dgm:prSet presAssocID="{236E11EA-A701-4530-9533-CECAD140DA60}" presName="Name25" presStyleLbl="parChTrans1D3" presStyleIdx="1" presStyleCnt="3"/>
-      <dgm:spPr/>
-    </dgm:pt>
-    <dgm:pt modelId="{898EBEE6-718F-4CBD-A471-4D7353D2EB0B}" type="pres">
-      <dgm:prSet presAssocID="{236E11EA-A701-4530-9533-CECAD140DA60}" presName="connTx" presStyleLbl="parChTrans1D3" presStyleIdx="1" presStyleCnt="3"/>
-      <dgm:spPr/>
-    </dgm:pt>
-    <dgm:pt modelId="{07759127-B7BD-48AE-BB0D-0BA847A7713D}" type="pres">
-      <dgm:prSet presAssocID="{9D345C4B-33F0-4844-B985-E67DCB9F8F1E}" presName="Name30" presStyleCnt="0"/>
-      <dgm:spPr/>
-    </dgm:pt>
-    <dgm:pt modelId="{165C5976-14BD-4E86-A924-B4DC61FEFE2D}" type="pres">
-      <dgm:prSet presAssocID="{9D345C4B-33F0-4844-B985-E67DCB9F8F1E}" presName="level2Shape" presStyleLbl="node3" presStyleIdx="1" presStyleCnt="3"/>
-      <dgm:spPr/>
-    </dgm:pt>
-    <dgm:pt modelId="{CB09D4B1-3933-44F6-973E-F157DC4F799B}" type="pres">
-      <dgm:prSet presAssocID="{9D345C4B-33F0-4844-B985-E67DCB9F8F1E}" presName="hierChild3" presStyleCnt="0"/>
-      <dgm:spPr/>
-    </dgm:pt>
-    <dgm:pt modelId="{CA2175F0-661D-4F52-BB60-D098E4CF301E}" type="pres">
-      <dgm:prSet presAssocID="{06442029-26F0-4485-9BA1-70AC52AB9FDD}" presName="Name25" presStyleLbl="parChTrans1D2" presStyleIdx="1" presStyleCnt="2"/>
-      <dgm:spPr/>
-    </dgm:pt>
-    <dgm:pt modelId="{5F95F7ED-5007-4513-B3C6-AB107DD67974}" type="pres">
-      <dgm:prSet presAssocID="{06442029-26F0-4485-9BA1-70AC52AB9FDD}" presName="connTx" presStyleLbl="parChTrans1D2" presStyleIdx="1" presStyleCnt="2"/>
-      <dgm:spPr/>
-    </dgm:pt>
-    <dgm:pt modelId="{096CA627-ABB8-44AB-A607-903F35B694CB}" type="pres">
-      <dgm:prSet presAssocID="{8894A0DC-2024-4518-A9DD-06A9AA0C8516}" presName="Name30" presStyleCnt="0"/>
-      <dgm:spPr/>
-    </dgm:pt>
-    <dgm:pt modelId="{0B228379-917C-4462-876B-8BA09E5A2CF8}" type="pres">
-      <dgm:prSet presAssocID="{8894A0DC-2024-4518-A9DD-06A9AA0C8516}" presName="level2Shape" presStyleLbl="node2" presStyleIdx="1" presStyleCnt="2"/>
-      <dgm:spPr/>
       <dgm:t>
         <a:bodyPr/>
         <a:lstStyle/>
@@ -2787,24 +2862,8 @@
         </a:p>
       </dgm:t>
     </dgm:pt>
-    <dgm:pt modelId="{616512B4-357C-4A81-9939-2F6B27706F27}" type="pres">
-      <dgm:prSet presAssocID="{8894A0DC-2024-4518-A9DD-06A9AA0C8516}" presName="hierChild3" presStyleCnt="0"/>
-      <dgm:spPr/>
-    </dgm:pt>
-    <dgm:pt modelId="{BA32C234-F8C9-401E-AF60-42D3862B9B3A}" type="pres">
-      <dgm:prSet presAssocID="{0C047200-23BA-4BE9-A241-571FFEA9C0AA}" presName="Name25" presStyleLbl="parChTrans1D3" presStyleIdx="2" presStyleCnt="3"/>
-      <dgm:spPr/>
-    </dgm:pt>
-    <dgm:pt modelId="{F503C4FB-6A3C-4531-8833-6E9A3E22B982}" type="pres">
-      <dgm:prSet presAssocID="{0C047200-23BA-4BE9-A241-571FFEA9C0AA}" presName="connTx" presStyleLbl="parChTrans1D3" presStyleIdx="2" presStyleCnt="3"/>
-      <dgm:spPr/>
-    </dgm:pt>
-    <dgm:pt modelId="{5C3E19E4-1C5B-4B65-B00A-53F4C9218B5F}" type="pres">
-      <dgm:prSet presAssocID="{F66D399A-DD2A-4E4F-A18B-D45BE00AD232}" presName="Name30" presStyleCnt="0"/>
-      <dgm:spPr/>
-    </dgm:pt>
-    <dgm:pt modelId="{29ECACD1-90DF-41BC-877A-66150360A70D}" type="pres">
-      <dgm:prSet presAssocID="{F66D399A-DD2A-4E4F-A18B-D45BE00AD232}" presName="level2Shape" presStyleLbl="node3" presStyleIdx="2" presStyleCnt="3"/>
+    <dgm:pt modelId="{40CA99EB-A8C7-4C4F-902D-2F4D1AB0EF7B}" type="pres">
+      <dgm:prSet presAssocID="{FC9CEC5D-EFAF-4C5D-8EE7-9B64DE26A74A}" presName="connTx" presStyleLbl="parChTrans1D2" presStyleIdx="0" presStyleCnt="2"/>
       <dgm:spPr/>
       <dgm:t>
         <a:bodyPr/>
@@ -2814,6 +2873,185 @@
         </a:p>
       </dgm:t>
     </dgm:pt>
+    <dgm:pt modelId="{6E3D0FDE-1CC1-4A02-A7D6-90E104EB42D6}" type="pres">
+      <dgm:prSet presAssocID="{3D2C7853-AFBC-4389-8FF1-94A6C4CC512B}" presName="Name30" presStyleCnt="0"/>
+      <dgm:spPr/>
+    </dgm:pt>
+    <dgm:pt modelId="{5605A27C-E0DA-4DC6-B669-C9FCEB55EC46}" type="pres">
+      <dgm:prSet presAssocID="{3D2C7853-AFBC-4389-8FF1-94A6C4CC512B}" presName="level2Shape" presStyleLbl="node2" presStyleIdx="0" presStyleCnt="2"/>
+      <dgm:spPr/>
+      <dgm:t>
+        <a:bodyPr/>
+        <a:lstStyle/>
+        <a:p>
+          <a:endParaRPr lang="en-US"/>
+        </a:p>
+      </dgm:t>
+    </dgm:pt>
+    <dgm:pt modelId="{400077A6-AA09-4DE0-904F-DB1A09607E8B}" type="pres">
+      <dgm:prSet presAssocID="{3D2C7853-AFBC-4389-8FF1-94A6C4CC512B}" presName="hierChild3" presStyleCnt="0"/>
+      <dgm:spPr/>
+    </dgm:pt>
+    <dgm:pt modelId="{D93E91CC-5971-400C-9645-3CE8160C8269}" type="pres">
+      <dgm:prSet presAssocID="{0F373F17-DDC8-43A9-98AB-21B1D2B076ED}" presName="Name25" presStyleLbl="parChTrans1D3" presStyleIdx="0" presStyleCnt="3"/>
+      <dgm:spPr/>
+      <dgm:t>
+        <a:bodyPr/>
+        <a:lstStyle/>
+        <a:p>
+          <a:endParaRPr lang="en-US"/>
+        </a:p>
+      </dgm:t>
+    </dgm:pt>
+    <dgm:pt modelId="{9868EC7E-9FF4-4611-9DC7-C52D47ADDF26}" type="pres">
+      <dgm:prSet presAssocID="{0F373F17-DDC8-43A9-98AB-21B1D2B076ED}" presName="connTx" presStyleLbl="parChTrans1D3" presStyleIdx="0" presStyleCnt="3"/>
+      <dgm:spPr/>
+      <dgm:t>
+        <a:bodyPr/>
+        <a:lstStyle/>
+        <a:p>
+          <a:endParaRPr lang="en-US"/>
+        </a:p>
+      </dgm:t>
+    </dgm:pt>
+    <dgm:pt modelId="{5242BDEA-1CCB-42EB-AD6A-1A687B03B294}" type="pres">
+      <dgm:prSet presAssocID="{E0F4CF46-513A-44AF-A021-62688F438A54}" presName="Name30" presStyleCnt="0"/>
+      <dgm:spPr/>
+    </dgm:pt>
+    <dgm:pt modelId="{ECA487D3-8B1A-4685-91DB-4D0D21D0AAC3}" type="pres">
+      <dgm:prSet presAssocID="{E0F4CF46-513A-44AF-A021-62688F438A54}" presName="level2Shape" presStyleLbl="node3" presStyleIdx="0" presStyleCnt="3"/>
+      <dgm:spPr/>
+      <dgm:t>
+        <a:bodyPr/>
+        <a:lstStyle/>
+        <a:p>
+          <a:endParaRPr lang="en-US"/>
+        </a:p>
+      </dgm:t>
+    </dgm:pt>
+    <dgm:pt modelId="{7B53D306-C06C-43C3-9F2B-C556EC912A03}" type="pres">
+      <dgm:prSet presAssocID="{E0F4CF46-513A-44AF-A021-62688F438A54}" presName="hierChild3" presStyleCnt="0"/>
+      <dgm:spPr/>
+    </dgm:pt>
+    <dgm:pt modelId="{E588BB08-9230-4AE3-B029-9FDFC1829342}" type="pres">
+      <dgm:prSet presAssocID="{236E11EA-A701-4530-9533-CECAD140DA60}" presName="Name25" presStyleLbl="parChTrans1D3" presStyleIdx="1" presStyleCnt="3"/>
+      <dgm:spPr/>
+      <dgm:t>
+        <a:bodyPr/>
+        <a:lstStyle/>
+        <a:p>
+          <a:endParaRPr lang="en-US"/>
+        </a:p>
+      </dgm:t>
+    </dgm:pt>
+    <dgm:pt modelId="{898EBEE6-718F-4CBD-A471-4D7353D2EB0B}" type="pres">
+      <dgm:prSet presAssocID="{236E11EA-A701-4530-9533-CECAD140DA60}" presName="connTx" presStyleLbl="parChTrans1D3" presStyleIdx="1" presStyleCnt="3"/>
+      <dgm:spPr/>
+      <dgm:t>
+        <a:bodyPr/>
+        <a:lstStyle/>
+        <a:p>
+          <a:endParaRPr lang="en-US"/>
+        </a:p>
+      </dgm:t>
+    </dgm:pt>
+    <dgm:pt modelId="{07759127-B7BD-48AE-BB0D-0BA847A7713D}" type="pres">
+      <dgm:prSet presAssocID="{9D345C4B-33F0-4844-B985-E67DCB9F8F1E}" presName="Name30" presStyleCnt="0"/>
+      <dgm:spPr/>
+    </dgm:pt>
+    <dgm:pt modelId="{165C5976-14BD-4E86-A924-B4DC61FEFE2D}" type="pres">
+      <dgm:prSet presAssocID="{9D345C4B-33F0-4844-B985-E67DCB9F8F1E}" presName="level2Shape" presStyleLbl="node3" presStyleIdx="1" presStyleCnt="3"/>
+      <dgm:spPr/>
+      <dgm:t>
+        <a:bodyPr/>
+        <a:lstStyle/>
+        <a:p>
+          <a:endParaRPr lang="en-US"/>
+        </a:p>
+      </dgm:t>
+    </dgm:pt>
+    <dgm:pt modelId="{CB09D4B1-3933-44F6-973E-F157DC4F799B}" type="pres">
+      <dgm:prSet presAssocID="{9D345C4B-33F0-4844-B985-E67DCB9F8F1E}" presName="hierChild3" presStyleCnt="0"/>
+      <dgm:spPr/>
+    </dgm:pt>
+    <dgm:pt modelId="{CA2175F0-661D-4F52-BB60-D098E4CF301E}" type="pres">
+      <dgm:prSet presAssocID="{06442029-26F0-4485-9BA1-70AC52AB9FDD}" presName="Name25" presStyleLbl="parChTrans1D2" presStyleIdx="1" presStyleCnt="2"/>
+      <dgm:spPr/>
+      <dgm:t>
+        <a:bodyPr/>
+        <a:lstStyle/>
+        <a:p>
+          <a:endParaRPr lang="en-US"/>
+        </a:p>
+      </dgm:t>
+    </dgm:pt>
+    <dgm:pt modelId="{5F95F7ED-5007-4513-B3C6-AB107DD67974}" type="pres">
+      <dgm:prSet presAssocID="{06442029-26F0-4485-9BA1-70AC52AB9FDD}" presName="connTx" presStyleLbl="parChTrans1D2" presStyleIdx="1" presStyleCnt="2"/>
+      <dgm:spPr/>
+      <dgm:t>
+        <a:bodyPr/>
+        <a:lstStyle/>
+        <a:p>
+          <a:endParaRPr lang="en-US"/>
+        </a:p>
+      </dgm:t>
+    </dgm:pt>
+    <dgm:pt modelId="{096CA627-ABB8-44AB-A607-903F35B694CB}" type="pres">
+      <dgm:prSet presAssocID="{8894A0DC-2024-4518-A9DD-06A9AA0C8516}" presName="Name30" presStyleCnt="0"/>
+      <dgm:spPr/>
+    </dgm:pt>
+    <dgm:pt modelId="{0B228379-917C-4462-876B-8BA09E5A2CF8}" type="pres">
+      <dgm:prSet presAssocID="{8894A0DC-2024-4518-A9DD-06A9AA0C8516}" presName="level2Shape" presStyleLbl="node2" presStyleIdx="1" presStyleCnt="2"/>
+      <dgm:spPr/>
+      <dgm:t>
+        <a:bodyPr/>
+        <a:lstStyle/>
+        <a:p>
+          <a:endParaRPr lang="en-US"/>
+        </a:p>
+      </dgm:t>
+    </dgm:pt>
+    <dgm:pt modelId="{616512B4-357C-4A81-9939-2F6B27706F27}" type="pres">
+      <dgm:prSet presAssocID="{8894A0DC-2024-4518-A9DD-06A9AA0C8516}" presName="hierChild3" presStyleCnt="0"/>
+      <dgm:spPr/>
+    </dgm:pt>
+    <dgm:pt modelId="{BA32C234-F8C9-401E-AF60-42D3862B9B3A}" type="pres">
+      <dgm:prSet presAssocID="{0C047200-23BA-4BE9-A241-571FFEA9C0AA}" presName="Name25" presStyleLbl="parChTrans1D3" presStyleIdx="2" presStyleCnt="3"/>
+      <dgm:spPr/>
+      <dgm:t>
+        <a:bodyPr/>
+        <a:lstStyle/>
+        <a:p>
+          <a:endParaRPr lang="en-US"/>
+        </a:p>
+      </dgm:t>
+    </dgm:pt>
+    <dgm:pt modelId="{F503C4FB-6A3C-4531-8833-6E9A3E22B982}" type="pres">
+      <dgm:prSet presAssocID="{0C047200-23BA-4BE9-A241-571FFEA9C0AA}" presName="connTx" presStyleLbl="parChTrans1D3" presStyleIdx="2" presStyleCnt="3"/>
+      <dgm:spPr/>
+      <dgm:t>
+        <a:bodyPr/>
+        <a:lstStyle/>
+        <a:p>
+          <a:endParaRPr lang="en-US"/>
+        </a:p>
+      </dgm:t>
+    </dgm:pt>
+    <dgm:pt modelId="{5C3E19E4-1C5B-4B65-B00A-53F4C9218B5F}" type="pres">
+      <dgm:prSet presAssocID="{F66D399A-DD2A-4E4F-A18B-D45BE00AD232}" presName="Name30" presStyleCnt="0"/>
+      <dgm:spPr/>
+    </dgm:pt>
+    <dgm:pt modelId="{29ECACD1-90DF-41BC-877A-66150360A70D}" type="pres">
+      <dgm:prSet presAssocID="{F66D399A-DD2A-4E4F-A18B-D45BE00AD232}" presName="level2Shape" presStyleLbl="node3" presStyleIdx="2" presStyleCnt="3"/>
+      <dgm:spPr/>
+      <dgm:t>
+        <a:bodyPr/>
+        <a:lstStyle/>
+        <a:p>
+          <a:endParaRPr lang="en-US"/>
+        </a:p>
+      </dgm:t>
+    </dgm:pt>
     <dgm:pt modelId="{7B653BDB-B86B-45B1-8937-0C4EA495D5EB}" type="pres">
       <dgm:prSet presAssocID="{F66D399A-DD2A-4E4F-A18B-D45BE00AD232}" presName="hierChild3" presStyleCnt="0"/>
       <dgm:spPr/>
@@ -2829,6 +3067,13 @@
     <dgm:pt modelId="{7F829706-49F8-4FE2-909D-624ED645D185}" type="pres">
       <dgm:prSet presAssocID="{3080FDB2-1EE4-4999-B20F-A7E3B20DC397}" presName="bgRect" presStyleLbl="bgShp" presStyleIdx="0" presStyleCnt="3"/>
       <dgm:spPr/>
+      <dgm:t>
+        <a:bodyPr/>
+        <a:lstStyle/>
+        <a:p>
+          <a:endParaRPr lang="en-US"/>
+        </a:p>
+      </dgm:t>
     </dgm:pt>
     <dgm:pt modelId="{05813EFB-E618-4CFC-88D4-9E8BE0CE3481}" type="pres">
       <dgm:prSet presAssocID="{3080FDB2-1EE4-4999-B20F-A7E3B20DC397}" presName="bgRectTx" presStyleLbl="bgShp" presStyleIdx="0" presStyleCnt="3">
@@ -2837,6 +3082,13 @@
         </dgm:presLayoutVars>
       </dgm:prSet>
       <dgm:spPr/>
+      <dgm:t>
+        <a:bodyPr/>
+        <a:lstStyle/>
+        <a:p>
+          <a:endParaRPr lang="en-US"/>
+        </a:p>
+      </dgm:t>
     </dgm:pt>
     <dgm:pt modelId="{766C4F46-23DA-4DD2-8376-62FE9DF4BF65}" type="pres">
       <dgm:prSet presAssocID="{3080FDB2-1EE4-4999-B20F-A7E3B20DC397}" presName="spComp" presStyleCnt="0"/>
@@ -2853,6 +3105,13 @@
     <dgm:pt modelId="{0C18B89A-7373-4A7D-BEC0-36E0AB596B49}" type="pres">
       <dgm:prSet presAssocID="{61FEC309-25AB-4243-B8B6-B093BBDC5E2E}" presName="bgRect" presStyleLbl="bgShp" presStyleIdx="1" presStyleCnt="3"/>
       <dgm:spPr/>
+      <dgm:t>
+        <a:bodyPr/>
+        <a:lstStyle/>
+        <a:p>
+          <a:endParaRPr lang="en-US"/>
+        </a:p>
+      </dgm:t>
     </dgm:pt>
     <dgm:pt modelId="{0C13162E-EBF5-4BE4-B488-B801A2F81B4A}" type="pres">
       <dgm:prSet presAssocID="{61FEC309-25AB-4243-B8B6-B093BBDC5E2E}" presName="bgRectTx" presStyleLbl="bgShp" presStyleIdx="1" presStyleCnt="3">
@@ -2861,6 +3120,13 @@
         </dgm:presLayoutVars>
       </dgm:prSet>
       <dgm:spPr/>
+      <dgm:t>
+        <a:bodyPr/>
+        <a:lstStyle/>
+        <a:p>
+          <a:endParaRPr lang="en-US"/>
+        </a:p>
+      </dgm:t>
     </dgm:pt>
     <dgm:pt modelId="{1933C4F2-4E00-4A4C-9414-E3AAA639F673}" type="pres">
       <dgm:prSet presAssocID="{61FEC309-25AB-4243-B8B6-B093BBDC5E2E}" presName="spComp" presStyleCnt="0"/>
@@ -2877,6 +3143,13 @@
     <dgm:pt modelId="{CE4DBF05-53AF-47E4-B319-13092F6ADA51}" type="pres">
       <dgm:prSet presAssocID="{232E259F-2711-427F-B4BA-19988A27ECFC}" presName="bgRect" presStyleLbl="bgShp" presStyleIdx="2" presStyleCnt="3"/>
       <dgm:spPr/>
+      <dgm:t>
+        <a:bodyPr/>
+        <a:lstStyle/>
+        <a:p>
+          <a:endParaRPr lang="en-US"/>
+        </a:p>
+      </dgm:t>
     </dgm:pt>
     <dgm:pt modelId="{6D150BF1-07D2-40C8-99B5-72FA6120A482}" type="pres">
       <dgm:prSet presAssocID="{232E259F-2711-427F-B4BA-19988A27ECFC}" presName="bgRectTx" presStyleLbl="bgShp" presStyleIdx="2" presStyleCnt="3">
@@ -2885,6 +3158,13 @@
         </dgm:presLayoutVars>
       </dgm:prSet>
       <dgm:spPr/>
+      <dgm:t>
+        <a:bodyPr/>
+        <a:lstStyle/>
+        <a:p>
+          <a:endParaRPr lang="en-US"/>
+        </a:p>
+      </dgm:t>
     </dgm:pt>
   </dgm:ptLst>
   <dgm:cxnLst>
@@ -2915,8 +3195,8 @@
     <dgm:cxn modelId="{859CFA74-90EF-41B8-B737-F956838F44F5}" srcId="{8F3A4C41-CB28-4015-97A2-280907CE4EDA}" destId="{3D2C7853-AFBC-4389-8FF1-94A6C4CC512B}" srcOrd="0" destOrd="0" parTransId="{FC9CEC5D-EFAF-4C5D-8EE7-9B64DE26A74A}" sibTransId="{5C41F9BE-A66E-45A0-8B6D-E860F9C26D82}"/>
     <dgm:cxn modelId="{434E2AC7-7E34-47B2-96F6-13655FBF253C}" type="presOf" srcId="{8F3A4C41-CB28-4015-97A2-280907CE4EDA}" destId="{B67A883D-F03B-4951-8888-E2DF146DD8FF}" srcOrd="0" destOrd="0" presId="urn:microsoft.com/office/officeart/2005/8/layout/hierarchy5"/>
     <dgm:cxn modelId="{141E9610-DCD1-4667-B61E-0B42A9EEC804}" type="presOf" srcId="{236E11EA-A701-4530-9533-CECAD140DA60}" destId="{898EBEE6-718F-4CBD-A471-4D7353D2EB0B}" srcOrd="1" destOrd="0" presId="urn:microsoft.com/office/officeart/2005/8/layout/hierarchy5"/>
+    <dgm:cxn modelId="{6B1F7CE3-2436-479F-8EBD-3EB4195CD2D9}" type="presOf" srcId="{232E259F-2711-427F-B4BA-19988A27ECFC}" destId="{6D150BF1-07D2-40C8-99B5-72FA6120A482}" srcOrd="1" destOrd="0" presId="urn:microsoft.com/office/officeart/2005/8/layout/hierarchy5"/>
     <dgm:cxn modelId="{D168A1E9-E53D-4758-9013-32CC4E88BBEB}" srcId="{3D2C7853-AFBC-4389-8FF1-94A6C4CC512B}" destId="{E0F4CF46-513A-44AF-A021-62688F438A54}" srcOrd="0" destOrd="0" parTransId="{0F373F17-DDC8-43A9-98AB-21B1D2B076ED}" sibTransId="{9ADB4BB8-858C-4C33-B2EE-16CD6EE599C3}"/>
-    <dgm:cxn modelId="{6B1F7CE3-2436-479F-8EBD-3EB4195CD2D9}" type="presOf" srcId="{232E259F-2711-427F-B4BA-19988A27ECFC}" destId="{6D150BF1-07D2-40C8-99B5-72FA6120A482}" srcOrd="1" destOrd="0" presId="urn:microsoft.com/office/officeart/2005/8/layout/hierarchy5"/>
     <dgm:cxn modelId="{32619693-F69B-467F-9F45-6AC179FBF81B}" srcId="{3D2C7853-AFBC-4389-8FF1-94A6C4CC512B}" destId="{9D345C4B-33F0-4844-B985-E67DCB9F8F1E}" srcOrd="1" destOrd="0" parTransId="{236E11EA-A701-4530-9533-CECAD140DA60}" sibTransId="{BE14B0F8-CDC1-4C5B-AF32-D93580A94D9B}"/>
     <dgm:cxn modelId="{03260A24-1A5B-486F-B1BC-A01D80259EFE}" type="presOf" srcId="{232E259F-2711-427F-B4BA-19988A27ECFC}" destId="{CE4DBF05-53AF-47E4-B319-13092F6ADA51}" srcOrd="0" destOrd="0" presId="urn:microsoft.com/office/officeart/2005/8/layout/hierarchy5"/>
     <dgm:cxn modelId="{21639054-5A1E-4498-A338-F11EC78A34E7}" type="presOf" srcId="{0C047200-23BA-4BE9-A241-571FFEA9C0AA}" destId="{BA32C234-F8C9-401E-AF60-42D3862B9B3A}" srcOrd="0" destOrd="0" presId="urn:microsoft.com/office/officeart/2005/8/layout/hierarchy5"/>
@@ -2984,1096 +3264,6 @@
       <dsp:cNvGrpSpPr/>
     </dsp:nvGrpSpPr>
     <dsp:grpSpPr/>
-    <dsp:sp modelId="{52588206-222C-452E-B875-DD3F66C6482F}">
-      <dsp:nvSpPr>
-        <dsp:cNvPr id="0" name=""/>
-        <dsp:cNvSpPr/>
-      </dsp:nvSpPr>
-      <dsp:spPr>
-        <a:xfrm>
-          <a:off x="6649888" y="0"/>
-          <a:ext cx="2088132" cy="4351338"/>
-        </a:xfrm>
-        <a:prstGeom prst="roundRect">
-          <a:avLst>
-            <a:gd name="adj" fmla="val 10000"/>
-          </a:avLst>
-        </a:prstGeom>
-        <a:solidFill>
-          <a:schemeClr val="accent1">
-            <a:tint val="40000"/>
-            <a:hueOff val="0"/>
-            <a:satOff val="0"/>
-            <a:lumOff val="0"/>
-            <a:alphaOff val="0"/>
-          </a:schemeClr>
-        </a:solidFill>
-        <a:ln>
-          <a:noFill/>
-        </a:ln>
-        <a:effectLst/>
-      </dsp:spPr>
-      <dsp:style>
-        <a:lnRef idx="0">
-          <a:scrgbClr r="0" g="0" b="0"/>
-        </a:lnRef>
-        <a:fillRef idx="1">
-          <a:scrgbClr r="0" g="0" b="0"/>
-        </a:fillRef>
-        <a:effectRef idx="0">
-          <a:scrgbClr r="0" g="0" b="0"/>
-        </a:effectRef>
-        <a:fontRef idx="minor"/>
-      </dsp:style>
-      <dsp:txBody>
-        <a:bodyPr spcFirstLastPara="0" vert="horz" wrap="square" lIns="227584" tIns="227584" rIns="227584" bIns="227584" numCol="1" spcCol="1270" anchor="ctr" anchorCtr="0">
-          <a:noAutofit/>
-        </a:bodyPr>
-        <a:lstStyle/>
-        <a:p>
-          <a:pPr lvl="0" algn="ctr" defTabSz="1422400">
-            <a:lnSpc>
-              <a:spcPct val="90000"/>
-            </a:lnSpc>
-            <a:spcBef>
-              <a:spcPct val="0"/>
-            </a:spcBef>
-            <a:spcAft>
-              <a:spcPct val="35000"/>
-            </a:spcAft>
-          </a:pPr>
-          <a:r>
-            <a:rPr lang="en-US" sz="3200" kern="1200" dirty="0" smtClean="0"/>
-            <a:t>Blob</a:t>
-          </a:r>
-          <a:endParaRPr lang="en-US" sz="3200" kern="1200" dirty="0"/>
-        </a:p>
-      </dsp:txBody>
-      <dsp:txXfrm>
-        <a:off x="6649888" y="0"/>
-        <a:ext cx="2088132" cy="1305401"/>
-      </dsp:txXfrm>
-    </dsp:sp>
-    <dsp:sp modelId="{6AC0380A-D4E4-4D98-A6DE-8B77223A12E9}">
-      <dsp:nvSpPr>
-        <dsp:cNvPr id="0" name=""/>
-        <dsp:cNvSpPr/>
-      </dsp:nvSpPr>
-      <dsp:spPr>
-        <a:xfrm>
-          <a:off x="4213733" y="0"/>
-          <a:ext cx="2088132" cy="4351338"/>
-        </a:xfrm>
-        <a:prstGeom prst="roundRect">
-          <a:avLst>
-            <a:gd name="adj" fmla="val 10000"/>
-          </a:avLst>
-        </a:prstGeom>
-        <a:solidFill>
-          <a:schemeClr val="accent1">
-            <a:tint val="40000"/>
-            <a:hueOff val="0"/>
-            <a:satOff val="0"/>
-            <a:lumOff val="0"/>
-            <a:alphaOff val="0"/>
-          </a:schemeClr>
-        </a:solidFill>
-        <a:ln>
-          <a:noFill/>
-        </a:ln>
-        <a:effectLst/>
-      </dsp:spPr>
-      <dsp:style>
-        <a:lnRef idx="0">
-          <a:scrgbClr r="0" g="0" b="0"/>
-        </a:lnRef>
-        <a:fillRef idx="1">
-          <a:scrgbClr r="0" g="0" b="0"/>
-        </a:fillRef>
-        <a:effectRef idx="0">
-          <a:scrgbClr r="0" g="0" b="0"/>
-        </a:effectRef>
-        <a:fontRef idx="minor"/>
-      </dsp:style>
-      <dsp:txBody>
-        <a:bodyPr spcFirstLastPara="0" vert="horz" wrap="square" lIns="227584" tIns="227584" rIns="227584" bIns="227584" numCol="1" spcCol="1270" anchor="ctr" anchorCtr="0">
-          <a:noAutofit/>
-        </a:bodyPr>
-        <a:lstStyle/>
-        <a:p>
-          <a:pPr lvl="0" algn="ctr" defTabSz="1422400">
-            <a:lnSpc>
-              <a:spcPct val="90000"/>
-            </a:lnSpc>
-            <a:spcBef>
-              <a:spcPct val="0"/>
-            </a:spcBef>
-            <a:spcAft>
-              <a:spcPct val="35000"/>
-            </a:spcAft>
-          </a:pPr>
-          <a:r>
-            <a:rPr lang="en-US" sz="3200" kern="1200" dirty="0" smtClean="0"/>
-            <a:t>Container</a:t>
-          </a:r>
-          <a:endParaRPr lang="en-US" sz="3200" kern="1200" dirty="0"/>
-        </a:p>
-      </dsp:txBody>
-      <dsp:txXfrm>
-        <a:off x="4213733" y="0"/>
-        <a:ext cx="2088132" cy="1305401"/>
-      </dsp:txXfrm>
-    </dsp:sp>
-    <dsp:sp modelId="{5BD92FB9-5AB2-423A-8E1A-8FD678F75648}">
-      <dsp:nvSpPr>
-        <dsp:cNvPr id="0" name=""/>
-        <dsp:cNvSpPr/>
-      </dsp:nvSpPr>
-      <dsp:spPr>
-        <a:xfrm>
-          <a:off x="1777579" y="0"/>
-          <a:ext cx="2088132" cy="4351338"/>
-        </a:xfrm>
-        <a:prstGeom prst="roundRect">
-          <a:avLst>
-            <a:gd name="adj" fmla="val 10000"/>
-          </a:avLst>
-        </a:prstGeom>
-        <a:solidFill>
-          <a:schemeClr val="accent1">
-            <a:tint val="40000"/>
-            <a:hueOff val="0"/>
-            <a:satOff val="0"/>
-            <a:lumOff val="0"/>
-            <a:alphaOff val="0"/>
-          </a:schemeClr>
-        </a:solidFill>
-        <a:ln>
-          <a:noFill/>
-        </a:ln>
-        <a:effectLst/>
-      </dsp:spPr>
-      <dsp:style>
-        <a:lnRef idx="0">
-          <a:scrgbClr r="0" g="0" b="0"/>
-        </a:lnRef>
-        <a:fillRef idx="1">
-          <a:scrgbClr r="0" g="0" b="0"/>
-        </a:fillRef>
-        <a:effectRef idx="0">
-          <a:scrgbClr r="0" g="0" b="0"/>
-        </a:effectRef>
-        <a:fontRef idx="minor"/>
-      </dsp:style>
-      <dsp:txBody>
-        <a:bodyPr spcFirstLastPara="0" vert="horz" wrap="square" lIns="227584" tIns="227584" rIns="227584" bIns="227584" numCol="1" spcCol="1270" anchor="ctr" anchorCtr="0">
-          <a:noAutofit/>
-        </a:bodyPr>
-        <a:lstStyle/>
-        <a:p>
-          <a:pPr lvl="0" algn="ctr" defTabSz="1422400">
-            <a:lnSpc>
-              <a:spcPct val="90000"/>
-            </a:lnSpc>
-            <a:spcBef>
-              <a:spcPct val="0"/>
-            </a:spcBef>
-            <a:spcAft>
-              <a:spcPct val="35000"/>
-            </a:spcAft>
-          </a:pPr>
-          <a:r>
-            <a:rPr lang="en-US" sz="3200" kern="1200" dirty="0" smtClean="0"/>
-            <a:t>Account</a:t>
-          </a:r>
-          <a:endParaRPr lang="en-US" sz="3200" kern="1200" dirty="0"/>
-        </a:p>
-      </dsp:txBody>
-      <dsp:txXfrm>
-        <a:off x="1777579" y="0"/>
-        <a:ext cx="2088132" cy="1305401"/>
-      </dsp:txXfrm>
-    </dsp:sp>
-    <dsp:sp modelId="{79DBC7F8-2F1E-4572-BB3B-4AE2F88AB81E}">
-      <dsp:nvSpPr>
-        <dsp:cNvPr id="0" name=""/>
-        <dsp:cNvSpPr/>
-      </dsp:nvSpPr>
-      <dsp:spPr>
-        <a:xfrm>
-          <a:off x="1951590" y="2556456"/>
-          <a:ext cx="1740110" cy="870055"/>
-        </a:xfrm>
-        <a:prstGeom prst="roundRect">
-          <a:avLst>
-            <a:gd name="adj" fmla="val 10000"/>
-          </a:avLst>
-        </a:prstGeom>
-        <a:solidFill>
-          <a:schemeClr val="accent1">
-            <a:hueOff val="0"/>
-            <a:satOff val="0"/>
-            <a:lumOff val="0"/>
-            <a:alphaOff val="0"/>
-          </a:schemeClr>
-        </a:solidFill>
-        <a:ln w="12700" cap="flat" cmpd="sng" algn="ctr">
-          <a:solidFill>
-            <a:schemeClr val="lt1">
-              <a:hueOff val="0"/>
-              <a:satOff val="0"/>
-              <a:lumOff val="0"/>
-              <a:alphaOff val="0"/>
-            </a:schemeClr>
-          </a:solidFill>
-          <a:prstDash val="solid"/>
-          <a:miter lim="800000"/>
-        </a:ln>
-        <a:effectLst/>
-      </dsp:spPr>
-      <dsp:style>
-        <a:lnRef idx="2">
-          <a:scrgbClr r="0" g="0" b="0"/>
-        </a:lnRef>
-        <a:fillRef idx="1">
-          <a:scrgbClr r="0" g="0" b="0"/>
-        </a:fillRef>
-        <a:effectRef idx="0">
-          <a:scrgbClr r="0" g="0" b="0"/>
-        </a:effectRef>
-        <a:fontRef idx="minor">
-          <a:schemeClr val="lt1"/>
-        </a:fontRef>
-      </dsp:style>
-      <dsp:txBody>
-        <a:bodyPr spcFirstLastPara="0" vert="horz" wrap="square" lIns="16510" tIns="16510" rIns="16510" bIns="16510" numCol="1" spcCol="1270" anchor="ctr" anchorCtr="0">
-          <a:noAutofit/>
-        </a:bodyPr>
-        <a:lstStyle/>
-        <a:p>
-          <a:pPr lvl="0" algn="ctr" defTabSz="1155700">
-            <a:lnSpc>
-              <a:spcPct val="90000"/>
-            </a:lnSpc>
-            <a:spcBef>
-              <a:spcPct val="0"/>
-            </a:spcBef>
-            <a:spcAft>
-              <a:spcPct val="35000"/>
-            </a:spcAft>
-          </a:pPr>
-          <a:r>
-            <a:rPr lang="en-US" sz="2600" kern="1200" dirty="0" smtClean="0"/>
-            <a:t>Joe</a:t>
-          </a:r>
-          <a:endParaRPr lang="en-US" sz="2600" kern="1200" dirty="0"/>
-        </a:p>
-      </dsp:txBody>
-      <dsp:txXfrm>
-        <a:off x="1977073" y="2581939"/>
-        <a:ext cx="1689144" cy="819089"/>
-      </dsp:txXfrm>
-    </dsp:sp>
-    <dsp:sp modelId="{D288014C-3523-4477-B75E-1FCECF49E873}">
-      <dsp:nvSpPr>
-        <dsp:cNvPr id="0" name=""/>
-        <dsp:cNvSpPr/>
-      </dsp:nvSpPr>
-      <dsp:spPr>
-        <a:xfrm rot="18770822">
-          <a:off x="3527958" y="2598276"/>
-          <a:ext cx="1023528" cy="35991"/>
-        </a:xfrm>
-        <a:custGeom>
-          <a:avLst/>
-          <a:gdLst/>
-          <a:ahLst/>
-          <a:cxnLst/>
-          <a:rect l="0" t="0" r="0" b="0"/>
-          <a:pathLst>
-            <a:path>
-              <a:moveTo>
-                <a:pt x="0" y="17995"/>
-              </a:moveTo>
-              <a:lnTo>
-                <a:pt x="1023528" y="17995"/>
-              </a:lnTo>
-            </a:path>
-          </a:pathLst>
-        </a:custGeom>
-        <a:noFill/>
-        <a:ln w="12700" cap="flat" cmpd="sng" algn="ctr">
-          <a:solidFill>
-            <a:schemeClr val="accent1">
-              <a:shade val="60000"/>
-              <a:hueOff val="0"/>
-              <a:satOff val="0"/>
-              <a:lumOff val="0"/>
-              <a:alphaOff val="0"/>
-            </a:schemeClr>
-          </a:solidFill>
-          <a:prstDash val="solid"/>
-          <a:miter lim="800000"/>
-        </a:ln>
-        <a:effectLst/>
-      </dsp:spPr>
-      <dsp:style>
-        <a:lnRef idx="2">
-          <a:scrgbClr r="0" g="0" b="0"/>
-        </a:lnRef>
-        <a:fillRef idx="0">
-          <a:scrgbClr r="0" g="0" b="0"/>
-        </a:fillRef>
-        <a:effectRef idx="0">
-          <a:scrgbClr r="0" g="0" b="0"/>
-        </a:effectRef>
-        <a:fontRef idx="minor"/>
-      </dsp:style>
-      <dsp:txBody>
-        <a:bodyPr spcFirstLastPara="0" vert="horz" wrap="square" lIns="12700" tIns="0" rIns="12700" bIns="0" numCol="1" spcCol="1270" anchor="ctr" anchorCtr="0">
-          <a:noAutofit/>
-        </a:bodyPr>
-        <a:lstStyle/>
-        <a:p>
-          <a:pPr lvl="0" algn="ctr" defTabSz="222250">
-            <a:lnSpc>
-              <a:spcPct val="90000"/>
-            </a:lnSpc>
-            <a:spcBef>
-              <a:spcPct val="0"/>
-            </a:spcBef>
-            <a:spcAft>
-              <a:spcPct val="35000"/>
-            </a:spcAft>
-          </a:pPr>
-          <a:endParaRPr lang="en-US" sz="500" kern="1200"/>
-        </a:p>
-      </dsp:txBody>
-      <dsp:txXfrm>
-        <a:off x="4014134" y="2590684"/>
-        <a:ext cx="51176" cy="51176"/>
-      </dsp:txXfrm>
-    </dsp:sp>
-    <dsp:sp modelId="{1DC923BE-4EF5-42DA-8517-61665C2754EB}">
-      <dsp:nvSpPr>
-        <dsp:cNvPr id="0" name=""/>
-        <dsp:cNvSpPr/>
-      </dsp:nvSpPr>
-      <dsp:spPr>
-        <a:xfrm>
-          <a:off x="4387744" y="1806033"/>
-          <a:ext cx="1740110" cy="870055"/>
-        </a:xfrm>
-        <a:prstGeom prst="roundRect">
-          <a:avLst>
-            <a:gd name="adj" fmla="val 10000"/>
-          </a:avLst>
-        </a:prstGeom>
-        <a:solidFill>
-          <a:schemeClr val="accent1">
-            <a:hueOff val="0"/>
-            <a:satOff val="0"/>
-            <a:lumOff val="0"/>
-            <a:alphaOff val="0"/>
-          </a:schemeClr>
-        </a:solidFill>
-        <a:ln w="12700" cap="flat" cmpd="sng" algn="ctr">
-          <a:solidFill>
-            <a:schemeClr val="lt1">
-              <a:hueOff val="0"/>
-              <a:satOff val="0"/>
-              <a:lumOff val="0"/>
-              <a:alphaOff val="0"/>
-            </a:schemeClr>
-          </a:solidFill>
-          <a:prstDash val="solid"/>
-          <a:miter lim="800000"/>
-        </a:ln>
-        <a:effectLst/>
-      </dsp:spPr>
-      <dsp:style>
-        <a:lnRef idx="2">
-          <a:scrgbClr r="0" g="0" b="0"/>
-        </a:lnRef>
-        <a:fillRef idx="1">
-          <a:scrgbClr r="0" g="0" b="0"/>
-        </a:fillRef>
-        <a:effectRef idx="0">
-          <a:scrgbClr r="0" g="0" b="0"/>
-        </a:effectRef>
-        <a:fontRef idx="minor">
-          <a:schemeClr val="lt1"/>
-        </a:fontRef>
-      </dsp:style>
-      <dsp:txBody>
-        <a:bodyPr spcFirstLastPara="0" vert="horz" wrap="square" lIns="16510" tIns="16510" rIns="16510" bIns="16510" numCol="1" spcCol="1270" anchor="ctr" anchorCtr="0">
-          <a:noAutofit/>
-        </a:bodyPr>
-        <a:lstStyle/>
-        <a:p>
-          <a:pPr lvl="0" algn="ctr" defTabSz="1155700">
-            <a:lnSpc>
-              <a:spcPct val="90000"/>
-            </a:lnSpc>
-            <a:spcBef>
-              <a:spcPct val="0"/>
-            </a:spcBef>
-            <a:spcAft>
-              <a:spcPct val="35000"/>
-            </a:spcAft>
-          </a:pPr>
-          <a:r>
-            <a:rPr lang="en-US" sz="2600" kern="1200" dirty="0" smtClean="0"/>
-            <a:t>photos</a:t>
-          </a:r>
-          <a:endParaRPr lang="en-US" sz="2600" kern="1200" dirty="0"/>
-        </a:p>
-      </dsp:txBody>
-      <dsp:txXfrm>
-        <a:off x="4413227" y="1831516"/>
-        <a:ext cx="1689144" cy="819089"/>
-      </dsp:txXfrm>
-    </dsp:sp>
-    <dsp:sp modelId="{DD8A9B2E-E296-47C0-8000-922200AD4C78}">
-      <dsp:nvSpPr>
-        <dsp:cNvPr id="0" name=""/>
-        <dsp:cNvSpPr/>
-      </dsp:nvSpPr>
-      <dsp:spPr>
-        <a:xfrm rot="19457599">
-          <a:off x="6047286" y="1972924"/>
-          <a:ext cx="857180" cy="35991"/>
-        </a:xfrm>
-        <a:custGeom>
-          <a:avLst/>
-          <a:gdLst/>
-          <a:ahLst/>
-          <a:cxnLst/>
-          <a:rect l="0" t="0" r="0" b="0"/>
-          <a:pathLst>
-            <a:path>
-              <a:moveTo>
-                <a:pt x="0" y="17995"/>
-              </a:moveTo>
-              <a:lnTo>
-                <a:pt x="857180" y="17995"/>
-              </a:lnTo>
-            </a:path>
-          </a:pathLst>
-        </a:custGeom>
-        <a:noFill/>
-        <a:ln w="12700" cap="flat" cmpd="sng" algn="ctr">
-          <a:solidFill>
-            <a:schemeClr val="accent1">
-              <a:shade val="80000"/>
-              <a:hueOff val="0"/>
-              <a:satOff val="0"/>
-              <a:lumOff val="0"/>
-              <a:alphaOff val="0"/>
-            </a:schemeClr>
-          </a:solidFill>
-          <a:prstDash val="solid"/>
-          <a:miter lim="800000"/>
-        </a:ln>
-        <a:effectLst/>
-      </dsp:spPr>
-      <dsp:style>
-        <a:lnRef idx="2">
-          <a:scrgbClr r="0" g="0" b="0"/>
-        </a:lnRef>
-        <a:fillRef idx="0">
-          <a:scrgbClr r="0" g="0" b="0"/>
-        </a:fillRef>
-        <a:effectRef idx="0">
-          <a:scrgbClr r="0" g="0" b="0"/>
-        </a:effectRef>
-        <a:fontRef idx="minor"/>
-      </dsp:style>
-      <dsp:txBody>
-        <a:bodyPr spcFirstLastPara="0" vert="horz" wrap="square" lIns="12700" tIns="0" rIns="12700" bIns="0" numCol="1" spcCol="1270" anchor="ctr" anchorCtr="0">
-          <a:noAutofit/>
-        </a:bodyPr>
-        <a:lstStyle/>
-        <a:p>
-          <a:pPr lvl="0" algn="ctr" defTabSz="222250">
-            <a:lnSpc>
-              <a:spcPct val="90000"/>
-            </a:lnSpc>
-            <a:spcBef>
-              <a:spcPct val="0"/>
-            </a:spcBef>
-            <a:spcAft>
-              <a:spcPct val="35000"/>
-            </a:spcAft>
-          </a:pPr>
-          <a:endParaRPr lang="en-US" sz="500" kern="1200"/>
-        </a:p>
-      </dsp:txBody>
-      <dsp:txXfrm>
-        <a:off x="6454447" y="1969490"/>
-        <a:ext cx="42859" cy="42859"/>
-      </dsp:txXfrm>
-    </dsp:sp>
-    <dsp:sp modelId="{D380E640-43FF-4569-83A7-3E1A450D90BB}">
-      <dsp:nvSpPr>
-        <dsp:cNvPr id="0" name=""/>
-        <dsp:cNvSpPr/>
-      </dsp:nvSpPr>
-      <dsp:spPr>
-        <a:xfrm>
-          <a:off x="6823899" y="1305751"/>
-          <a:ext cx="1740110" cy="870055"/>
-        </a:xfrm>
-        <a:prstGeom prst="roundRect">
-          <a:avLst>
-            <a:gd name="adj" fmla="val 10000"/>
-          </a:avLst>
-        </a:prstGeom>
-        <a:solidFill>
-          <a:schemeClr val="accent1">
-            <a:hueOff val="0"/>
-            <a:satOff val="0"/>
-            <a:lumOff val="0"/>
-            <a:alphaOff val="0"/>
-          </a:schemeClr>
-        </a:solidFill>
-        <a:ln w="12700" cap="flat" cmpd="sng" algn="ctr">
-          <a:solidFill>
-            <a:schemeClr val="lt1">
-              <a:hueOff val="0"/>
-              <a:satOff val="0"/>
-              <a:lumOff val="0"/>
-              <a:alphaOff val="0"/>
-            </a:schemeClr>
-          </a:solidFill>
-          <a:prstDash val="solid"/>
-          <a:miter lim="800000"/>
-        </a:ln>
-        <a:effectLst/>
-      </dsp:spPr>
-      <dsp:style>
-        <a:lnRef idx="2">
-          <a:scrgbClr r="0" g="0" b="0"/>
-        </a:lnRef>
-        <a:fillRef idx="1">
-          <a:scrgbClr r="0" g="0" b="0"/>
-        </a:fillRef>
-        <a:effectRef idx="0">
-          <a:scrgbClr r="0" g="0" b="0"/>
-        </a:effectRef>
-        <a:fontRef idx="minor">
-          <a:schemeClr val="lt1"/>
-        </a:fontRef>
-      </dsp:style>
-      <dsp:txBody>
-        <a:bodyPr spcFirstLastPara="0" vert="horz" wrap="square" lIns="16510" tIns="16510" rIns="16510" bIns="16510" numCol="1" spcCol="1270" anchor="ctr" anchorCtr="0">
-          <a:noAutofit/>
-        </a:bodyPr>
-        <a:lstStyle/>
-        <a:p>
-          <a:pPr lvl="0" algn="ctr" defTabSz="1155700">
-            <a:lnSpc>
-              <a:spcPct val="90000"/>
-            </a:lnSpc>
-            <a:spcBef>
-              <a:spcPct val="0"/>
-            </a:spcBef>
-            <a:spcAft>
-              <a:spcPct val="35000"/>
-            </a:spcAft>
-          </a:pPr>
-          <a:r>
-            <a:rPr lang="en-US" sz="2600" kern="1200" dirty="0" smtClean="0"/>
-            <a:t>Photo1.jpeg</a:t>
-          </a:r>
-          <a:endParaRPr lang="en-US" sz="2600" kern="1200" dirty="0"/>
-        </a:p>
-      </dsp:txBody>
-      <dsp:txXfrm>
-        <a:off x="6849382" y="1331234"/>
-        <a:ext cx="1689144" cy="819089"/>
-      </dsp:txXfrm>
-    </dsp:sp>
-    <dsp:sp modelId="{D5FA0CD8-7B13-4C06-849E-35CC554CD50E}">
-      <dsp:nvSpPr>
-        <dsp:cNvPr id="0" name=""/>
-        <dsp:cNvSpPr/>
-      </dsp:nvSpPr>
-      <dsp:spPr>
-        <a:xfrm rot="2142401">
-          <a:off x="6047286" y="2473206"/>
-          <a:ext cx="857180" cy="35991"/>
-        </a:xfrm>
-        <a:custGeom>
-          <a:avLst/>
-          <a:gdLst/>
-          <a:ahLst/>
-          <a:cxnLst/>
-          <a:rect l="0" t="0" r="0" b="0"/>
-          <a:pathLst>
-            <a:path>
-              <a:moveTo>
-                <a:pt x="0" y="17995"/>
-              </a:moveTo>
-              <a:lnTo>
-                <a:pt x="857180" y="17995"/>
-              </a:lnTo>
-            </a:path>
-          </a:pathLst>
-        </a:custGeom>
-        <a:noFill/>
-        <a:ln w="12700" cap="flat" cmpd="sng" algn="ctr">
-          <a:solidFill>
-            <a:schemeClr val="accent1">
-              <a:shade val="80000"/>
-              <a:hueOff val="0"/>
-              <a:satOff val="0"/>
-              <a:lumOff val="0"/>
-              <a:alphaOff val="0"/>
-            </a:schemeClr>
-          </a:solidFill>
-          <a:prstDash val="solid"/>
-          <a:miter lim="800000"/>
-        </a:ln>
-        <a:effectLst/>
-      </dsp:spPr>
-      <dsp:style>
-        <a:lnRef idx="2">
-          <a:scrgbClr r="0" g="0" b="0"/>
-        </a:lnRef>
-        <a:fillRef idx="0">
-          <a:scrgbClr r="0" g="0" b="0"/>
-        </a:fillRef>
-        <a:effectRef idx="0">
-          <a:scrgbClr r="0" g="0" b="0"/>
-        </a:effectRef>
-        <a:fontRef idx="minor"/>
-      </dsp:style>
-      <dsp:txBody>
-        <a:bodyPr spcFirstLastPara="0" vert="horz" wrap="square" lIns="12700" tIns="0" rIns="12700" bIns="0" numCol="1" spcCol="1270" anchor="ctr" anchorCtr="0">
-          <a:noAutofit/>
-        </a:bodyPr>
-        <a:lstStyle/>
-        <a:p>
-          <a:pPr lvl="0" algn="ctr" defTabSz="222250">
-            <a:lnSpc>
-              <a:spcPct val="90000"/>
-            </a:lnSpc>
-            <a:spcBef>
-              <a:spcPct val="0"/>
-            </a:spcBef>
-            <a:spcAft>
-              <a:spcPct val="35000"/>
-            </a:spcAft>
-          </a:pPr>
-          <a:endParaRPr lang="en-US" sz="500" kern="1200"/>
-        </a:p>
-      </dsp:txBody>
-      <dsp:txXfrm>
-        <a:off x="6454447" y="2469772"/>
-        <a:ext cx="42859" cy="42859"/>
-      </dsp:txXfrm>
-    </dsp:sp>
-    <dsp:sp modelId="{D2A55942-24C2-443D-BE47-D1253E0F9BEF}">
-      <dsp:nvSpPr>
-        <dsp:cNvPr id="0" name=""/>
-        <dsp:cNvSpPr/>
-      </dsp:nvSpPr>
-      <dsp:spPr>
-        <a:xfrm>
-          <a:off x="6823899" y="2306315"/>
-          <a:ext cx="1740110" cy="870055"/>
-        </a:xfrm>
-        <a:prstGeom prst="roundRect">
-          <a:avLst>
-            <a:gd name="adj" fmla="val 10000"/>
-          </a:avLst>
-        </a:prstGeom>
-        <a:solidFill>
-          <a:schemeClr val="accent1">
-            <a:hueOff val="0"/>
-            <a:satOff val="0"/>
-            <a:lumOff val="0"/>
-            <a:alphaOff val="0"/>
-          </a:schemeClr>
-        </a:solidFill>
-        <a:ln w="12700" cap="flat" cmpd="sng" algn="ctr">
-          <a:solidFill>
-            <a:schemeClr val="lt1">
-              <a:hueOff val="0"/>
-              <a:satOff val="0"/>
-              <a:lumOff val="0"/>
-              <a:alphaOff val="0"/>
-            </a:schemeClr>
-          </a:solidFill>
-          <a:prstDash val="solid"/>
-          <a:miter lim="800000"/>
-        </a:ln>
-        <a:effectLst/>
-      </dsp:spPr>
-      <dsp:style>
-        <a:lnRef idx="2">
-          <a:scrgbClr r="0" g="0" b="0"/>
-        </a:lnRef>
-        <a:fillRef idx="1">
-          <a:scrgbClr r="0" g="0" b="0"/>
-        </a:fillRef>
-        <a:effectRef idx="0">
-          <a:scrgbClr r="0" g="0" b="0"/>
-        </a:effectRef>
-        <a:fontRef idx="minor">
-          <a:schemeClr val="lt1"/>
-        </a:fontRef>
-      </dsp:style>
-      <dsp:txBody>
-        <a:bodyPr spcFirstLastPara="0" vert="horz" wrap="square" lIns="16510" tIns="16510" rIns="16510" bIns="16510" numCol="1" spcCol="1270" anchor="ctr" anchorCtr="0">
-          <a:noAutofit/>
-        </a:bodyPr>
-        <a:lstStyle/>
-        <a:p>
-          <a:pPr lvl="0" algn="ctr" defTabSz="1155700">
-            <a:lnSpc>
-              <a:spcPct val="90000"/>
-            </a:lnSpc>
-            <a:spcBef>
-              <a:spcPct val="0"/>
-            </a:spcBef>
-            <a:spcAft>
-              <a:spcPct val="35000"/>
-            </a:spcAft>
-          </a:pPr>
-          <a:r>
-            <a:rPr lang="en-US" sz="2600" kern="1200" dirty="0" smtClean="0"/>
-            <a:t>Photo2.jpeg</a:t>
-          </a:r>
-          <a:endParaRPr lang="en-US" sz="2600" kern="1200" dirty="0"/>
-        </a:p>
-      </dsp:txBody>
-      <dsp:txXfrm>
-        <a:off x="6849382" y="2331798"/>
-        <a:ext cx="1689144" cy="819089"/>
-      </dsp:txXfrm>
-    </dsp:sp>
-    <dsp:sp modelId="{C918FCEE-4612-4AC8-966D-A84A3B6E5CBB}">
-      <dsp:nvSpPr>
-        <dsp:cNvPr id="0" name=""/>
-        <dsp:cNvSpPr/>
-      </dsp:nvSpPr>
-      <dsp:spPr>
-        <a:xfrm rot="2829178">
-          <a:off x="3527958" y="3348699"/>
-          <a:ext cx="1023528" cy="35991"/>
-        </a:xfrm>
-        <a:custGeom>
-          <a:avLst/>
-          <a:gdLst/>
-          <a:ahLst/>
-          <a:cxnLst/>
-          <a:rect l="0" t="0" r="0" b="0"/>
-          <a:pathLst>
-            <a:path>
-              <a:moveTo>
-                <a:pt x="0" y="17995"/>
-              </a:moveTo>
-              <a:lnTo>
-                <a:pt x="1023528" y="17995"/>
-              </a:lnTo>
-            </a:path>
-          </a:pathLst>
-        </a:custGeom>
-        <a:noFill/>
-        <a:ln w="12700" cap="flat" cmpd="sng" algn="ctr">
-          <a:solidFill>
-            <a:schemeClr val="accent1">
-              <a:shade val="60000"/>
-              <a:hueOff val="0"/>
-              <a:satOff val="0"/>
-              <a:lumOff val="0"/>
-              <a:alphaOff val="0"/>
-            </a:schemeClr>
-          </a:solidFill>
-          <a:prstDash val="solid"/>
-          <a:miter lim="800000"/>
-        </a:ln>
-        <a:effectLst/>
-      </dsp:spPr>
-      <dsp:style>
-        <a:lnRef idx="2">
-          <a:scrgbClr r="0" g="0" b="0"/>
-        </a:lnRef>
-        <a:fillRef idx="0">
-          <a:scrgbClr r="0" g="0" b="0"/>
-        </a:fillRef>
-        <a:effectRef idx="0">
-          <a:scrgbClr r="0" g="0" b="0"/>
-        </a:effectRef>
-        <a:fontRef idx="minor"/>
-      </dsp:style>
-      <dsp:txBody>
-        <a:bodyPr spcFirstLastPara="0" vert="horz" wrap="square" lIns="12700" tIns="0" rIns="12700" bIns="0" numCol="1" spcCol="1270" anchor="ctr" anchorCtr="0">
-          <a:noAutofit/>
-        </a:bodyPr>
-        <a:lstStyle/>
-        <a:p>
-          <a:pPr lvl="0" algn="ctr" defTabSz="222250">
-            <a:lnSpc>
-              <a:spcPct val="90000"/>
-            </a:lnSpc>
-            <a:spcBef>
-              <a:spcPct val="0"/>
-            </a:spcBef>
-            <a:spcAft>
-              <a:spcPct val="35000"/>
-            </a:spcAft>
-          </a:pPr>
-          <a:endParaRPr lang="en-US" sz="500" kern="1200"/>
-        </a:p>
-      </dsp:txBody>
-      <dsp:txXfrm>
-        <a:off x="4014134" y="3341106"/>
-        <a:ext cx="51176" cy="51176"/>
-      </dsp:txXfrm>
-    </dsp:sp>
-    <dsp:sp modelId="{575ABB36-2536-4BEE-B166-1F5CAC627ED9}">
-      <dsp:nvSpPr>
-        <dsp:cNvPr id="0" name=""/>
-        <dsp:cNvSpPr/>
-      </dsp:nvSpPr>
-      <dsp:spPr>
-        <a:xfrm>
-          <a:off x="4387744" y="3306878"/>
-          <a:ext cx="1740110" cy="870055"/>
-        </a:xfrm>
-        <a:prstGeom prst="roundRect">
-          <a:avLst>
-            <a:gd name="adj" fmla="val 10000"/>
-          </a:avLst>
-        </a:prstGeom>
-        <a:solidFill>
-          <a:schemeClr val="accent1">
-            <a:hueOff val="0"/>
-            <a:satOff val="0"/>
-            <a:lumOff val="0"/>
-            <a:alphaOff val="0"/>
-          </a:schemeClr>
-        </a:solidFill>
-        <a:ln w="12700" cap="flat" cmpd="sng" algn="ctr">
-          <a:solidFill>
-            <a:schemeClr val="lt1">
-              <a:hueOff val="0"/>
-              <a:satOff val="0"/>
-              <a:lumOff val="0"/>
-              <a:alphaOff val="0"/>
-            </a:schemeClr>
-          </a:solidFill>
-          <a:prstDash val="solid"/>
-          <a:miter lim="800000"/>
-        </a:ln>
-        <a:effectLst/>
-      </dsp:spPr>
-      <dsp:style>
-        <a:lnRef idx="2">
-          <a:scrgbClr r="0" g="0" b="0"/>
-        </a:lnRef>
-        <a:fillRef idx="1">
-          <a:scrgbClr r="0" g="0" b="0"/>
-        </a:fillRef>
-        <a:effectRef idx="0">
-          <a:scrgbClr r="0" g="0" b="0"/>
-        </a:effectRef>
-        <a:fontRef idx="minor">
-          <a:schemeClr val="lt1"/>
-        </a:fontRef>
-      </dsp:style>
-      <dsp:txBody>
-        <a:bodyPr spcFirstLastPara="0" vert="horz" wrap="square" lIns="16510" tIns="16510" rIns="16510" bIns="16510" numCol="1" spcCol="1270" anchor="ctr" anchorCtr="0">
-          <a:noAutofit/>
-        </a:bodyPr>
-        <a:lstStyle/>
-        <a:p>
-          <a:pPr lvl="0" algn="ctr" defTabSz="1155700">
-            <a:lnSpc>
-              <a:spcPct val="90000"/>
-            </a:lnSpc>
-            <a:spcBef>
-              <a:spcPct val="0"/>
-            </a:spcBef>
-            <a:spcAft>
-              <a:spcPct val="35000"/>
-            </a:spcAft>
-          </a:pPr>
-          <a:r>
-            <a:rPr lang="en-US" sz="2600" kern="1200" dirty="0" smtClean="0"/>
-            <a:t>thumbnails</a:t>
-          </a:r>
-          <a:endParaRPr lang="en-US" sz="2600" kern="1200" dirty="0"/>
-        </a:p>
-      </dsp:txBody>
-      <dsp:txXfrm>
-        <a:off x="4413227" y="3332361"/>
-        <a:ext cx="1689144" cy="819089"/>
-      </dsp:txXfrm>
-    </dsp:sp>
-    <dsp:sp modelId="{AEE26041-0EC8-4C2F-B740-B5D536742BB6}">
-      <dsp:nvSpPr>
-        <dsp:cNvPr id="0" name=""/>
-        <dsp:cNvSpPr/>
-      </dsp:nvSpPr>
-      <dsp:spPr>
-        <a:xfrm>
-          <a:off x="6127855" y="3723910"/>
-          <a:ext cx="696044" cy="35991"/>
-        </a:xfrm>
-        <a:custGeom>
-          <a:avLst/>
-          <a:gdLst/>
-          <a:ahLst/>
-          <a:cxnLst/>
-          <a:rect l="0" t="0" r="0" b="0"/>
-          <a:pathLst>
-            <a:path>
-              <a:moveTo>
-                <a:pt x="0" y="17995"/>
-              </a:moveTo>
-              <a:lnTo>
-                <a:pt x="696044" y="17995"/>
-              </a:lnTo>
-            </a:path>
-          </a:pathLst>
-        </a:custGeom>
-        <a:noFill/>
-        <a:ln w="12700" cap="flat" cmpd="sng" algn="ctr">
-          <a:solidFill>
-            <a:schemeClr val="accent1">
-              <a:shade val="80000"/>
-              <a:hueOff val="0"/>
-              <a:satOff val="0"/>
-              <a:lumOff val="0"/>
-              <a:alphaOff val="0"/>
-            </a:schemeClr>
-          </a:solidFill>
-          <a:prstDash val="solid"/>
-          <a:miter lim="800000"/>
-        </a:ln>
-        <a:effectLst/>
-      </dsp:spPr>
-      <dsp:style>
-        <a:lnRef idx="2">
-          <a:scrgbClr r="0" g="0" b="0"/>
-        </a:lnRef>
-        <a:fillRef idx="0">
-          <a:scrgbClr r="0" g="0" b="0"/>
-        </a:fillRef>
-        <a:effectRef idx="0">
-          <a:scrgbClr r="0" g="0" b="0"/>
-        </a:effectRef>
-        <a:fontRef idx="minor"/>
-      </dsp:style>
-      <dsp:txBody>
-        <a:bodyPr spcFirstLastPara="0" vert="horz" wrap="square" lIns="12700" tIns="0" rIns="12700" bIns="0" numCol="1" spcCol="1270" anchor="ctr" anchorCtr="0">
-          <a:noAutofit/>
-        </a:bodyPr>
-        <a:lstStyle/>
-        <a:p>
-          <a:pPr lvl="0" algn="ctr" defTabSz="222250">
-            <a:lnSpc>
-              <a:spcPct val="90000"/>
-            </a:lnSpc>
-            <a:spcBef>
-              <a:spcPct val="0"/>
-            </a:spcBef>
-            <a:spcAft>
-              <a:spcPct val="35000"/>
-            </a:spcAft>
-          </a:pPr>
-          <a:endParaRPr lang="en-US" sz="500" kern="1200"/>
-        </a:p>
-      </dsp:txBody>
-      <dsp:txXfrm>
-        <a:off x="6458476" y="3724505"/>
-        <a:ext cx="34802" cy="34802"/>
-      </dsp:txXfrm>
-    </dsp:sp>
-    <dsp:sp modelId="{87630057-8D34-4E32-9EA4-2707D2D0D058}">
-      <dsp:nvSpPr>
-        <dsp:cNvPr id="0" name=""/>
-        <dsp:cNvSpPr/>
-      </dsp:nvSpPr>
-      <dsp:spPr>
-        <a:xfrm>
-          <a:off x="6823899" y="3306878"/>
-          <a:ext cx="1740110" cy="870055"/>
-        </a:xfrm>
-        <a:prstGeom prst="roundRect">
-          <a:avLst>
-            <a:gd name="adj" fmla="val 10000"/>
-          </a:avLst>
-        </a:prstGeom>
-        <a:solidFill>
-          <a:schemeClr val="accent1">
-            <a:hueOff val="0"/>
-            <a:satOff val="0"/>
-            <a:lumOff val="0"/>
-            <a:alphaOff val="0"/>
-          </a:schemeClr>
-        </a:solidFill>
-        <a:ln w="12700" cap="flat" cmpd="sng" algn="ctr">
-          <a:solidFill>
-            <a:schemeClr val="lt1">
-              <a:hueOff val="0"/>
-              <a:satOff val="0"/>
-              <a:lumOff val="0"/>
-              <a:alphaOff val="0"/>
-            </a:schemeClr>
-          </a:solidFill>
-          <a:prstDash val="solid"/>
-          <a:miter lim="800000"/>
-        </a:ln>
-        <a:effectLst/>
-      </dsp:spPr>
-      <dsp:style>
-        <a:lnRef idx="2">
-          <a:scrgbClr r="0" g="0" b="0"/>
-        </a:lnRef>
-        <a:fillRef idx="1">
-          <a:scrgbClr r="0" g="0" b="0"/>
-        </a:fillRef>
-        <a:effectRef idx="0">
-          <a:scrgbClr r="0" g="0" b="0"/>
-        </a:effectRef>
-        <a:fontRef idx="minor">
-          <a:schemeClr val="lt1"/>
-        </a:fontRef>
-      </dsp:style>
-      <dsp:txBody>
-        <a:bodyPr spcFirstLastPara="0" vert="horz" wrap="square" lIns="16510" tIns="16510" rIns="16510" bIns="16510" numCol="1" spcCol="1270" anchor="ctr" anchorCtr="0">
-          <a:noAutofit/>
-        </a:bodyPr>
-        <a:lstStyle/>
-        <a:p>
-          <a:pPr lvl="0" algn="ctr" defTabSz="1155700">
-            <a:lnSpc>
-              <a:spcPct val="90000"/>
-            </a:lnSpc>
-            <a:spcBef>
-              <a:spcPct val="0"/>
-            </a:spcBef>
-            <a:spcAft>
-              <a:spcPct val="35000"/>
-            </a:spcAft>
-          </a:pPr>
-          <a:r>
-            <a:rPr lang="en-US" sz="2600" kern="1200" dirty="0" smtClean="0"/>
-            <a:t>Photo1.jpeg</a:t>
-          </a:r>
-          <a:endParaRPr lang="en-US" sz="2600" kern="1200" dirty="0"/>
-        </a:p>
-      </dsp:txBody>
-      <dsp:txXfrm>
-        <a:off x="6849382" y="3332361"/>
-        <a:ext cx="1689144" cy="819089"/>
-      </dsp:txXfrm>
-    </dsp:sp>
   </dsp:spTree>
 </dsp:drawing>
 </file>
@@ -11270,11 +10460,7 @@
           <a:p>
             <a:r>
               <a:rPr lang="en-US" dirty="0" smtClean="0"/>
-              <a:t>Azure </a:t>
-            </a:r>
-            <a:r>
-              <a:rPr lang="en-US" dirty="0" smtClean="0"/>
-              <a:t>Storage Services</a:t>
+              <a:t>Azure Storage Services</a:t>
             </a:r>
             <a:endParaRPr lang="en-US" dirty="0"/>
           </a:p>
@@ -13105,11 +12291,7 @@
           <a:p>
             <a:r>
               <a:rPr lang="en-US" dirty="0" smtClean="0"/>
-              <a:t>Azure </a:t>
-            </a:r>
-            <a:r>
-              <a:rPr lang="en-US" dirty="0" smtClean="0"/>
-              <a:t>Storage </a:t>
+              <a:t>Azure Storage </a:t>
             </a:r>
             <a:r>
               <a:rPr lang="en-US" dirty="0"/>

</xml_diff>